<commit_message>
Updated mall customer analysis
</commit_message>
<xml_diff>
--- a/Capstone Projects/Capstone_Three_Unsupervised_ML/Classifying_Mall_Customers.pptx
+++ b/Capstone Projects/Capstone_Three_Unsupervised_ML/Classifying_Mall_Customers.pptx
@@ -29,14 +29,14 @@
     <p:sldId id="305" r:id="rId26"/>
     <p:sldId id="321" r:id="rId27"/>
     <p:sldId id="320" r:id="rId28"/>
-    <p:sldId id="307" r:id="rId29"/>
-    <p:sldId id="290" r:id="rId30"/>
-    <p:sldId id="309" r:id="rId31"/>
-    <p:sldId id="315" r:id="rId32"/>
-    <p:sldId id="316" r:id="rId33"/>
-    <p:sldId id="310" r:id="rId34"/>
-    <p:sldId id="312" r:id="rId35"/>
-    <p:sldId id="311" r:id="rId36"/>
+    <p:sldId id="322" r:id="rId29"/>
+    <p:sldId id="307" r:id="rId30"/>
+    <p:sldId id="290" r:id="rId31"/>
+    <p:sldId id="309" r:id="rId32"/>
+    <p:sldId id="315" r:id="rId33"/>
+    <p:sldId id="316" r:id="rId34"/>
+    <p:sldId id="310" r:id="rId35"/>
+    <p:sldId id="312" r:id="rId36"/>
     <p:sldId id="313" r:id="rId37"/>
   </p:sldIdLst>
   <p:sldSz cx="9144000" cy="5143500" type="screen16x9"/>
@@ -224,7 +224,7 @@
           <a:p>
             <a:fld id="{1D8BD707-D9CF-40AE-B4C6-C98DA3205C09}" type="datetimeFigureOut">
               <a:rPr lang="en-US"/>
-              <a:t>1/1/2024</a:t>
+              <a:t>1/2/2024</a:t>
             </a:fld>
             <a:endParaRPr lang="en-US"/>
           </a:p>
@@ -401,7 +401,7 @@
           <a:p>
             <a:fld id="{1D8BD707-D9CF-40AE-B4C6-C98DA3205C09}" type="datetimeFigureOut">
               <a:rPr lang="en-US"/>
-              <a:t>1/1/2024</a:t>
+              <a:t>1/2/2024</a:t>
             </a:fld>
             <a:endParaRPr lang="en-US"/>
           </a:p>
@@ -615,7 +615,7 @@
           <a:p>
             <a:fld id="{1D8BD707-D9CF-40AE-B4C6-C98DA3205C09}" type="datetimeFigureOut">
               <a:rPr lang="en-US"/>
-              <a:t>1/1/2024</a:t>
+              <a:t>1/2/2024</a:t>
             </a:fld>
             <a:endParaRPr lang="en-US"/>
           </a:p>
@@ -1059,7 +1059,7 @@
           <a:p>
             <a:fld id="{1D8BD707-D9CF-40AE-B4C6-C98DA3205C09}" type="datetimeFigureOut">
               <a:rPr lang="en-US"/>
-              <a:t>1/1/2024</a:t>
+              <a:t>1/2/2024</a:t>
             </a:fld>
             <a:endParaRPr lang="en-US"/>
           </a:p>
@@ -1178,7 +1178,7 @@
           <a:p>
             <a:fld id="{1D8BD707-D9CF-40AE-B4C6-C98DA3205C09}" type="datetimeFigureOut">
               <a:rPr lang="en-US"/>
-              <a:t>1/1/2024</a:t>
+              <a:t>1/2/2024</a:t>
             </a:fld>
             <a:endParaRPr lang="en-US"/>
           </a:p>
@@ -1403,7 +1403,7 @@
           <a:p>
             <a:fld id="{1D8BD707-D9CF-40AE-B4C6-C98DA3205C09}" type="datetimeFigureOut">
               <a:rPr lang="en-US"/>
-              <a:t>1/1/2024</a:t>
+              <a:t>1/2/2024</a:t>
             </a:fld>
             <a:endParaRPr lang="en-US"/>
           </a:p>
@@ -3360,7 +3360,7 @@
         <p:spPr>
           <a:xfrm>
             <a:off x="1066800" y="1846412"/>
-            <a:ext cx="6504940" cy="997709"/>
+            <a:ext cx="6504940" cy="1243930"/>
           </a:xfrm>
           <a:prstGeom prst="rect">
             <a:avLst/>
@@ -3424,7 +3424,7 @@
                 <a:cs typeface="Open Sans"/>
                 <a:sym typeface="Open Sans"/>
               </a:rPr>
-              <a:t>I now want to investigate if the features are highly correlated.</a:t>
+              <a:t>I now want to investigate if any of the features are highly correlated.</a:t>
             </a:r>
           </a:p>
           <a:p>
@@ -3736,8 +3736,8 @@
         </p:blipFill>
         <p:spPr>
           <a:xfrm>
-            <a:off x="290014" y="867298"/>
-            <a:ext cx="8563971" cy="4230586"/>
+            <a:off x="290015" y="867298"/>
+            <a:ext cx="8472986" cy="4185640"/>
           </a:xfrm>
           <a:prstGeom prst="rect">
             <a:avLst/>
@@ -4500,7 +4500,7 @@
             </a:pPr>
             <a:r>
               <a:rPr lang="en-US" sz="1400" dirty="0"/>
-              <a:t>Group 1: High income, skill, and education. High spending score.</a:t>
+              <a:t>Group 2: High income, skill, and education. High spending score.</a:t>
             </a:r>
           </a:p>
           <a:p>
@@ -4697,7 +4697,7 @@
                   <a:srgbClr val="FFFFFF"/>
                 </a:solidFill>
               </a:rPr>
-              <a:t>Model Selection, Clustering, and Dimensionality Reduction</a:t>
+              <a:t>Model Results, Clustering, and Dimensionality Reduction</a:t>
             </a:r>
             <a:endParaRPr sz="4200" dirty="0"/>
           </a:p>
@@ -5319,7 +5319,7 @@
         <p:spPr>
           <a:xfrm>
             <a:off x="1167800" y="1913273"/>
-            <a:ext cx="6458585" cy="2132187"/>
+            <a:ext cx="6458585" cy="2333203"/>
           </a:xfrm>
           <a:prstGeom prst="rect">
             <a:avLst/>
@@ -5340,19 +5340,35 @@
               </a:spcBef>
             </a:pPr>
             <a:r>
+              <a:rPr lang="en-US" sz="1400" b="1" spc="-20" dirty="0">
+                <a:latin typeface="Open Sans" panose="020B0606030504020204" pitchFamily="34" charset="0"/>
+                <a:ea typeface="Open Sans" panose="020B0606030504020204" pitchFamily="34" charset="0"/>
+                <a:cs typeface="Open Sans" panose="020B0606030504020204" pitchFamily="34" charset="0"/>
+              </a:rPr>
+              <a:t>T</a:t>
+            </a:r>
+            <a:r>
+              <a:rPr lang="en-US" sz="1400" b="1" dirty="0">
+                <a:latin typeface="Open Sans" panose="020B0606030504020204" pitchFamily="34" charset="0"/>
+                <a:ea typeface="Open Sans" panose="020B0606030504020204" pitchFamily="34" charset="0"/>
+                <a:cs typeface="Open Sans" panose="020B0606030504020204" pitchFamily="34" charset="0"/>
+              </a:rPr>
+              <a:t>hree continuous features </a:t>
+            </a:r>
+            <a:r>
+              <a:rPr sz="1400" b="1" dirty="0">
+                <a:latin typeface="Open Sans" panose="020B0606030504020204" pitchFamily="34" charset="0"/>
+                <a:ea typeface="Open Sans" panose="020B0606030504020204" pitchFamily="34" charset="0"/>
+                <a:cs typeface="Open Sans" panose="020B0606030504020204" pitchFamily="34" charset="0"/>
+              </a:rPr>
+              <a:t>sounds</a:t>
+            </a:r>
+            <a:r>
               <a:rPr sz="1400" b="1" spc="-20" dirty="0">
                 <a:latin typeface="Open Sans" panose="020B0606030504020204" pitchFamily="34" charset="0"/>
                 <a:ea typeface="Open Sans" panose="020B0606030504020204" pitchFamily="34" charset="0"/>
                 <a:cs typeface="Open Sans" panose="020B0606030504020204" pitchFamily="34" charset="0"/>
               </a:rPr>
-              <a:t>A</a:t>
-            </a:r>
-            <a:r>
-              <a:rPr sz="1400" b="1" spc="-80" dirty="0">
-                <a:latin typeface="Open Sans" panose="020B0606030504020204" pitchFamily="34" charset="0"/>
-                <a:ea typeface="Open Sans" panose="020B0606030504020204" pitchFamily="34" charset="0"/>
-                <a:cs typeface="Open Sans" panose="020B0606030504020204" pitchFamily="34" charset="0"/>
-              </a:rPr>
               <a:t> </a:t>
             </a:r>
             <a:r>
@@ -5361,7 +5377,63 @@
                 <a:ea typeface="Open Sans" panose="020B0606030504020204" pitchFamily="34" charset="0"/>
                 <a:cs typeface="Open Sans" panose="020B0606030504020204" pitchFamily="34" charset="0"/>
               </a:rPr>
-              <a:t>single,</a:t>
+              <a:t>like</a:t>
+            </a:r>
+            <a:r>
+              <a:rPr sz="1400" b="1" spc="-25" dirty="0">
+                <a:latin typeface="Open Sans" panose="020B0606030504020204" pitchFamily="34" charset="0"/>
+                <a:ea typeface="Open Sans" panose="020B0606030504020204" pitchFamily="34" charset="0"/>
+                <a:cs typeface="Open Sans" panose="020B0606030504020204" pitchFamily="34" charset="0"/>
+              </a:rPr>
+              <a:t> </a:t>
+            </a:r>
+            <a:r>
+              <a:rPr sz="1400" b="1" dirty="0">
+                <a:latin typeface="Open Sans" panose="020B0606030504020204" pitchFamily="34" charset="0"/>
+                <a:ea typeface="Open Sans" panose="020B0606030504020204" pitchFamily="34" charset="0"/>
+                <a:cs typeface="Open Sans" panose="020B0606030504020204" pitchFamily="34" charset="0"/>
+              </a:rPr>
+              <a:t>a</a:t>
+            </a:r>
+            <a:r>
+              <a:rPr sz="1400" b="1" spc="-20" dirty="0">
+                <a:latin typeface="Open Sans" panose="020B0606030504020204" pitchFamily="34" charset="0"/>
+                <a:ea typeface="Open Sans" panose="020B0606030504020204" pitchFamily="34" charset="0"/>
+                <a:cs typeface="Open Sans" panose="020B0606030504020204" pitchFamily="34" charset="0"/>
+              </a:rPr>
+              <a:t> </a:t>
+            </a:r>
+            <a:r>
+              <a:rPr sz="1400" b="1" dirty="0">
+                <a:latin typeface="Open Sans" panose="020B0606030504020204" pitchFamily="34" charset="0"/>
+                <a:ea typeface="Open Sans" panose="020B0606030504020204" pitchFamily="34" charset="0"/>
+                <a:cs typeface="Open Sans" panose="020B0606030504020204" pitchFamily="34" charset="0"/>
+              </a:rPr>
+              <a:t>great</a:t>
+            </a:r>
+            <a:r>
+              <a:rPr sz="1400" b="1" spc="-15" dirty="0">
+                <a:latin typeface="Open Sans" panose="020B0606030504020204" pitchFamily="34" charset="0"/>
+                <a:ea typeface="Open Sans" panose="020B0606030504020204" pitchFamily="34" charset="0"/>
+                <a:cs typeface="Open Sans" panose="020B0606030504020204" pitchFamily="34" charset="0"/>
+              </a:rPr>
+              <a:t> </a:t>
+            </a:r>
+            <a:r>
+              <a:rPr sz="1400" b="1" spc="-20" dirty="0">
+                <a:latin typeface="Open Sans" panose="020B0606030504020204" pitchFamily="34" charset="0"/>
+                <a:ea typeface="Open Sans" panose="020B0606030504020204" pitchFamily="34" charset="0"/>
+                <a:cs typeface="Open Sans" panose="020B0606030504020204" pitchFamily="34" charset="0"/>
+              </a:rPr>
+              <a:t>case </a:t>
+            </a:r>
+            <a:r>
+              <a:rPr sz="1400" b="1" dirty="0">
+                <a:latin typeface="Open Sans" panose="020B0606030504020204" pitchFamily="34" charset="0"/>
+                <a:ea typeface="Open Sans" panose="020B0606030504020204" pitchFamily="34" charset="0"/>
+                <a:cs typeface="Open Sans" panose="020B0606030504020204" pitchFamily="34" charset="0"/>
+              </a:rPr>
+              <a:t>for</a:t>
             </a:r>
             <a:r>
               <a:rPr sz="1400" b="1" spc="-35" dirty="0">
@@ -5370,169 +5442,6 @@
                 <a:cs typeface="Open Sans" panose="020B0606030504020204" pitchFamily="34" charset="0"/>
               </a:rPr>
               <a:t> </a:t>
-            </a:r>
-            <a:r>
-              <a:rPr lang="en-US" sz="1400" b="1" spc="-35" dirty="0">
-                <a:latin typeface="Open Sans" panose="020B0606030504020204" pitchFamily="34" charset="0"/>
-                <a:ea typeface="Open Sans" panose="020B0606030504020204" pitchFamily="34" charset="0"/>
-                <a:cs typeface="Open Sans" panose="020B0606030504020204" pitchFamily="34" charset="0"/>
-              </a:rPr>
-              <a:t>continuous</a:t>
-            </a:r>
-            <a:r>
-              <a:rPr sz="1400" b="1" spc="-15" dirty="0">
-                <a:latin typeface="Open Sans" panose="020B0606030504020204" pitchFamily="34" charset="0"/>
-                <a:ea typeface="Open Sans" panose="020B0606030504020204" pitchFamily="34" charset="0"/>
-                <a:cs typeface="Open Sans" panose="020B0606030504020204" pitchFamily="34" charset="0"/>
-              </a:rPr>
-              <a:t> </a:t>
-            </a:r>
-            <a:r>
-              <a:rPr lang="en-US" sz="1400" b="1" spc="-15" dirty="0">
-                <a:latin typeface="Open Sans" panose="020B0606030504020204" pitchFamily="34" charset="0"/>
-                <a:ea typeface="Open Sans" panose="020B0606030504020204" pitchFamily="34" charset="0"/>
-                <a:cs typeface="Open Sans" panose="020B0606030504020204" pitchFamily="34" charset="0"/>
-              </a:rPr>
-              <a:t>target </a:t>
-            </a:r>
-            <a:r>
-              <a:rPr sz="1400" b="1" spc="-10" dirty="0">
-                <a:latin typeface="Open Sans" panose="020B0606030504020204" pitchFamily="34" charset="0"/>
-                <a:ea typeface="Open Sans" panose="020B0606030504020204" pitchFamily="34" charset="0"/>
-                <a:cs typeface="Open Sans" panose="020B0606030504020204" pitchFamily="34" charset="0"/>
-              </a:rPr>
-              <a:t>variable</a:t>
-            </a:r>
-            <a:r>
-              <a:rPr sz="1400" b="1" spc="-25" dirty="0">
-                <a:latin typeface="Open Sans" panose="020B0606030504020204" pitchFamily="34" charset="0"/>
-                <a:ea typeface="Open Sans" panose="020B0606030504020204" pitchFamily="34" charset="0"/>
-                <a:cs typeface="Open Sans" panose="020B0606030504020204" pitchFamily="34" charset="0"/>
-              </a:rPr>
-              <a:t> </a:t>
-            </a:r>
-            <a:r>
-              <a:rPr sz="1400" b="1" dirty="0">
-                <a:latin typeface="Open Sans" panose="020B0606030504020204" pitchFamily="34" charset="0"/>
-                <a:ea typeface="Open Sans" panose="020B0606030504020204" pitchFamily="34" charset="0"/>
-                <a:cs typeface="Open Sans" panose="020B0606030504020204" pitchFamily="34" charset="0"/>
-              </a:rPr>
-              <a:t>with</a:t>
-            </a:r>
-            <a:r>
-              <a:rPr sz="1400" b="1" spc="-25" dirty="0">
-                <a:latin typeface="Open Sans" panose="020B0606030504020204" pitchFamily="34" charset="0"/>
-                <a:ea typeface="Open Sans" panose="020B0606030504020204" pitchFamily="34" charset="0"/>
-                <a:cs typeface="Open Sans" panose="020B0606030504020204" pitchFamily="34" charset="0"/>
-              </a:rPr>
-              <a:t> </a:t>
-            </a:r>
-            <a:r>
-              <a:rPr lang="en-US" sz="1400" b="1" dirty="0">
-                <a:latin typeface="Open Sans" panose="020B0606030504020204" pitchFamily="34" charset="0"/>
-                <a:ea typeface="Open Sans" panose="020B0606030504020204" pitchFamily="34" charset="0"/>
-                <a:cs typeface="Open Sans" panose="020B0606030504020204" pitchFamily="34" charset="0"/>
-              </a:rPr>
-              <a:t>three continuous features </a:t>
-            </a:r>
-            <a:r>
-              <a:rPr sz="1400" b="1" dirty="0">
-                <a:latin typeface="Open Sans" panose="020B0606030504020204" pitchFamily="34" charset="0"/>
-                <a:ea typeface="Open Sans" panose="020B0606030504020204" pitchFamily="34" charset="0"/>
-                <a:cs typeface="Open Sans" panose="020B0606030504020204" pitchFamily="34" charset="0"/>
-              </a:rPr>
-              <a:t>sounds</a:t>
-            </a:r>
-            <a:r>
-              <a:rPr sz="1400" b="1" spc="-20" dirty="0">
-                <a:latin typeface="Open Sans" panose="020B0606030504020204" pitchFamily="34" charset="0"/>
-                <a:ea typeface="Open Sans" panose="020B0606030504020204" pitchFamily="34" charset="0"/>
-                <a:cs typeface="Open Sans" panose="020B0606030504020204" pitchFamily="34" charset="0"/>
-              </a:rPr>
-              <a:t> </a:t>
-            </a:r>
-            <a:r>
-              <a:rPr sz="1400" b="1" dirty="0">
-                <a:latin typeface="Open Sans" panose="020B0606030504020204" pitchFamily="34" charset="0"/>
-                <a:ea typeface="Open Sans" panose="020B0606030504020204" pitchFamily="34" charset="0"/>
-                <a:cs typeface="Open Sans" panose="020B0606030504020204" pitchFamily="34" charset="0"/>
-              </a:rPr>
-              <a:t>like</a:t>
-            </a:r>
-            <a:r>
-              <a:rPr sz="1400" b="1" spc="-25" dirty="0">
-                <a:latin typeface="Open Sans" panose="020B0606030504020204" pitchFamily="34" charset="0"/>
-                <a:ea typeface="Open Sans" panose="020B0606030504020204" pitchFamily="34" charset="0"/>
-                <a:cs typeface="Open Sans" panose="020B0606030504020204" pitchFamily="34" charset="0"/>
-              </a:rPr>
-              <a:t> </a:t>
-            </a:r>
-            <a:r>
-              <a:rPr sz="1400" b="1" dirty="0">
-                <a:latin typeface="Open Sans" panose="020B0606030504020204" pitchFamily="34" charset="0"/>
-                <a:ea typeface="Open Sans" panose="020B0606030504020204" pitchFamily="34" charset="0"/>
-                <a:cs typeface="Open Sans" panose="020B0606030504020204" pitchFamily="34" charset="0"/>
-              </a:rPr>
-              <a:t>a</a:t>
-            </a:r>
-            <a:r>
-              <a:rPr sz="1400" b="1" spc="-20" dirty="0">
-                <a:latin typeface="Open Sans" panose="020B0606030504020204" pitchFamily="34" charset="0"/>
-                <a:ea typeface="Open Sans" panose="020B0606030504020204" pitchFamily="34" charset="0"/>
-                <a:cs typeface="Open Sans" panose="020B0606030504020204" pitchFamily="34" charset="0"/>
-              </a:rPr>
-              <a:t> </a:t>
-            </a:r>
-            <a:r>
-              <a:rPr sz="1400" b="1" dirty="0">
-                <a:latin typeface="Open Sans" panose="020B0606030504020204" pitchFamily="34" charset="0"/>
-                <a:ea typeface="Open Sans" panose="020B0606030504020204" pitchFamily="34" charset="0"/>
-                <a:cs typeface="Open Sans" panose="020B0606030504020204" pitchFamily="34" charset="0"/>
-              </a:rPr>
-              <a:t>great</a:t>
-            </a:r>
-            <a:r>
-              <a:rPr sz="1400" b="1" spc="-15" dirty="0">
-                <a:latin typeface="Open Sans" panose="020B0606030504020204" pitchFamily="34" charset="0"/>
-                <a:ea typeface="Open Sans" panose="020B0606030504020204" pitchFamily="34" charset="0"/>
-                <a:cs typeface="Open Sans" panose="020B0606030504020204" pitchFamily="34" charset="0"/>
-              </a:rPr>
-              <a:t> </a:t>
-            </a:r>
-            <a:r>
-              <a:rPr sz="1400" b="1" spc="-20" dirty="0">
-                <a:latin typeface="Open Sans" panose="020B0606030504020204" pitchFamily="34" charset="0"/>
-                <a:ea typeface="Open Sans" panose="020B0606030504020204" pitchFamily="34" charset="0"/>
-                <a:cs typeface="Open Sans" panose="020B0606030504020204" pitchFamily="34" charset="0"/>
-              </a:rPr>
-              <a:t>case </a:t>
-            </a:r>
-            <a:r>
-              <a:rPr sz="1400" b="1" dirty="0">
-                <a:latin typeface="Open Sans" panose="020B0606030504020204" pitchFamily="34" charset="0"/>
-                <a:ea typeface="Open Sans" panose="020B0606030504020204" pitchFamily="34" charset="0"/>
-                <a:cs typeface="Open Sans" panose="020B0606030504020204" pitchFamily="34" charset="0"/>
-              </a:rPr>
-              <a:t>for</a:t>
-            </a:r>
-            <a:r>
-              <a:rPr sz="1400" b="1" spc="-35" dirty="0">
-                <a:latin typeface="Open Sans" panose="020B0606030504020204" pitchFamily="34" charset="0"/>
-                <a:ea typeface="Open Sans" panose="020B0606030504020204" pitchFamily="34" charset="0"/>
-                <a:cs typeface="Open Sans" panose="020B0606030504020204" pitchFamily="34" charset="0"/>
-              </a:rPr>
-              <a:t> </a:t>
-            </a:r>
-            <a:r>
-              <a:rPr sz="1400" b="1" spc="-10" dirty="0">
-                <a:solidFill>
-                  <a:schemeClr val="accent5"/>
-                </a:solidFill>
-                <a:latin typeface="Open Sans" panose="020B0606030504020204" pitchFamily="34" charset="0"/>
-                <a:ea typeface="Open Sans" panose="020B0606030504020204" pitchFamily="34" charset="0"/>
-                <a:cs typeface="Open Sans" panose="020B0606030504020204" pitchFamily="34" charset="0"/>
-              </a:rPr>
-              <a:t>r</a:t>
             </a:r>
             <a:r>
               <a:rPr lang="en-US" sz="1400" b="1" spc="-10" dirty="0">
@@ -5543,7 +5452,15 @@
                 <a:ea typeface="Open Sans" panose="020B0606030504020204" pitchFamily="34" charset="0"/>
                 <a:cs typeface="Open Sans" panose="020B0606030504020204" pitchFamily="34" charset="0"/>
               </a:rPr>
-              <a:t>egression</a:t>
+              <a:t>clustering </a:t>
+            </a:r>
+            <a:r>
+              <a:rPr lang="en-US" sz="1400" b="1" spc="-20" dirty="0">
+                <a:latin typeface="Open Sans" panose="020B0606030504020204" pitchFamily="34" charset="0"/>
+                <a:ea typeface="Open Sans" panose="020B0606030504020204" pitchFamily="34" charset="0"/>
+                <a:cs typeface="Open Sans" panose="020B0606030504020204" pitchFamily="34" charset="0"/>
+              </a:rPr>
+              <a:t>customers into groups</a:t>
             </a:r>
             <a:r>
               <a:rPr sz="1400" b="1" spc="-10" dirty="0">
@@ -5573,52 +5490,28 @@
               </a:tabLst>
             </a:pPr>
             <a:r>
-              <a:rPr sz="1400" spc="-20" dirty="0">
+              <a:rPr lang="en-US" sz="1400" spc="-20" dirty="0">
                 <a:latin typeface="Open Sans" panose="020B0606030504020204" pitchFamily="34" charset="0"/>
                 <a:ea typeface="Open Sans" panose="020B0606030504020204" pitchFamily="34" charset="0"/>
                 <a:cs typeface="Open Sans" panose="020B0606030504020204" pitchFamily="34" charset="0"/>
               </a:rPr>
-              <a:t>A</a:t>
-            </a:r>
-            <a:r>
-              <a:rPr sz="1400" spc="-80" dirty="0">
+              <a:t>The </a:t>
+            </a:r>
+            <a:r>
+              <a:rPr lang="en-US" sz="1400" b="1" spc="-20" dirty="0">
                 <a:latin typeface="Open Sans" panose="020B0606030504020204" pitchFamily="34" charset="0"/>
                 <a:ea typeface="Open Sans" panose="020B0606030504020204" pitchFamily="34" charset="0"/>
                 <a:cs typeface="Open Sans" panose="020B0606030504020204" pitchFamily="34" charset="0"/>
               </a:rPr>
-              <a:t> </a:t>
-            </a:r>
-            <a:r>
-              <a:rPr sz="1400" b="1" dirty="0">
+              <a:t>K-Means</a:t>
+            </a:r>
+            <a:r>
+              <a:rPr lang="en-US" sz="1400" spc="-20" dirty="0">
                 <a:latin typeface="Open Sans" panose="020B0606030504020204" pitchFamily="34" charset="0"/>
                 <a:ea typeface="Open Sans" panose="020B0606030504020204" pitchFamily="34" charset="0"/>
                 <a:cs typeface="Open Sans" panose="020B0606030504020204" pitchFamily="34" charset="0"/>
               </a:rPr>
-              <a:t>random</a:t>
-            </a:r>
-            <a:r>
-              <a:rPr sz="1400" b="1" spc="-55" dirty="0">
-                <a:latin typeface="Open Sans" panose="020B0606030504020204" pitchFamily="34" charset="0"/>
-                <a:ea typeface="Open Sans" panose="020B0606030504020204" pitchFamily="34" charset="0"/>
-                <a:cs typeface="Open Sans" panose="020B0606030504020204" pitchFamily="34" charset="0"/>
-              </a:rPr>
-              <a:t> </a:t>
-            </a:r>
-            <a:r>
-              <a:rPr sz="1400" b="1" dirty="0">
-                <a:latin typeface="Open Sans" panose="020B0606030504020204" pitchFamily="34" charset="0"/>
-                <a:ea typeface="Open Sans" panose="020B0606030504020204" pitchFamily="34" charset="0"/>
-                <a:cs typeface="Open Sans" panose="020B0606030504020204" pitchFamily="34" charset="0"/>
-              </a:rPr>
-              <a:t>forest</a:t>
-            </a:r>
-            <a:r>
-              <a:rPr sz="1400" b="1" spc="-35" dirty="0">
-                <a:latin typeface="Open Sans" panose="020B0606030504020204" pitchFamily="34" charset="0"/>
-                <a:ea typeface="Open Sans" panose="020B0606030504020204" pitchFamily="34" charset="0"/>
-                <a:cs typeface="Open Sans" panose="020B0606030504020204" pitchFamily="34" charset="0"/>
-              </a:rPr>
-              <a:t> </a:t>
+              <a:t> algorithm </a:t>
             </a:r>
             <a:r>
               <a:rPr sz="1400" dirty="0">
@@ -5650,143 +5543,15 @@
                 <a:ea typeface="Open Sans" panose="020B0606030504020204" pitchFamily="34" charset="0"/>
                 <a:cs typeface="Open Sans" panose="020B0606030504020204" pitchFamily="34" charset="0"/>
               </a:rPr>
-              <a:t>choice,</a:t>
-            </a:r>
-            <a:r>
-              <a:rPr sz="1400" spc="-30" dirty="0">
+              <a:t>choice</a:t>
+            </a:r>
+            <a:r>
+              <a:rPr lang="en-US" sz="1400" dirty="0">
                 <a:latin typeface="Open Sans" panose="020B0606030504020204" pitchFamily="34" charset="0"/>
                 <a:ea typeface="Open Sans" panose="020B0606030504020204" pitchFamily="34" charset="0"/>
                 <a:cs typeface="Open Sans" panose="020B0606030504020204" pitchFamily="34" charset="0"/>
               </a:rPr>
-              <a:t> </a:t>
-            </a:r>
-            <a:r>
-              <a:rPr sz="1400" dirty="0">
-                <a:latin typeface="Open Sans" panose="020B0606030504020204" pitchFamily="34" charset="0"/>
-                <a:ea typeface="Open Sans" panose="020B0606030504020204" pitchFamily="34" charset="0"/>
-                <a:cs typeface="Open Sans" panose="020B0606030504020204" pitchFamily="34" charset="0"/>
-              </a:rPr>
-              <a:t>as</a:t>
-            </a:r>
-            <a:r>
-              <a:rPr sz="1400" spc="-35" dirty="0">
-                <a:latin typeface="Open Sans" panose="020B0606030504020204" pitchFamily="34" charset="0"/>
-                <a:ea typeface="Open Sans" panose="020B0606030504020204" pitchFamily="34" charset="0"/>
-                <a:cs typeface="Open Sans" panose="020B0606030504020204" pitchFamily="34" charset="0"/>
-              </a:rPr>
-              <a:t> </a:t>
-            </a:r>
-            <a:r>
-              <a:rPr sz="1400" dirty="0">
-                <a:latin typeface="Open Sans" panose="020B0606030504020204" pitchFamily="34" charset="0"/>
-                <a:ea typeface="Open Sans" panose="020B0606030504020204" pitchFamily="34" charset="0"/>
-                <a:cs typeface="Open Sans" panose="020B0606030504020204" pitchFamily="34" charset="0"/>
-              </a:rPr>
-              <a:t>they</a:t>
-            </a:r>
-            <a:r>
-              <a:rPr sz="1400" spc="-30" dirty="0">
-                <a:latin typeface="Open Sans" panose="020B0606030504020204" pitchFamily="34" charset="0"/>
-                <a:ea typeface="Open Sans" panose="020B0606030504020204" pitchFamily="34" charset="0"/>
-                <a:cs typeface="Open Sans" panose="020B0606030504020204" pitchFamily="34" charset="0"/>
-              </a:rPr>
-              <a:t> </a:t>
-            </a:r>
-            <a:r>
-              <a:rPr sz="1400" dirty="0">
-                <a:latin typeface="Open Sans" panose="020B0606030504020204" pitchFamily="34" charset="0"/>
-                <a:ea typeface="Open Sans" panose="020B0606030504020204" pitchFamily="34" charset="0"/>
-                <a:cs typeface="Open Sans" panose="020B0606030504020204" pitchFamily="34" charset="0"/>
-              </a:rPr>
-              <a:t>handle</a:t>
-            </a:r>
-            <a:r>
-              <a:rPr sz="1400" spc="-30" dirty="0">
-                <a:latin typeface="Open Sans" panose="020B0606030504020204" pitchFamily="34" charset="0"/>
-                <a:ea typeface="Open Sans" panose="020B0606030504020204" pitchFamily="34" charset="0"/>
-                <a:cs typeface="Open Sans" panose="020B0606030504020204" pitchFamily="34" charset="0"/>
-              </a:rPr>
-              <a:t> </a:t>
-            </a:r>
-            <a:r>
-              <a:rPr sz="1400" dirty="0">
-                <a:latin typeface="Open Sans" panose="020B0606030504020204" pitchFamily="34" charset="0"/>
-                <a:ea typeface="Open Sans" panose="020B0606030504020204" pitchFamily="34" charset="0"/>
-                <a:cs typeface="Open Sans" panose="020B0606030504020204" pitchFamily="34" charset="0"/>
-              </a:rPr>
-              <a:t>both</a:t>
-            </a:r>
-            <a:r>
-              <a:rPr sz="1400" spc="-30" dirty="0">
-                <a:latin typeface="Open Sans" panose="020B0606030504020204" pitchFamily="34" charset="0"/>
-                <a:ea typeface="Open Sans" panose="020B0606030504020204" pitchFamily="34" charset="0"/>
-                <a:cs typeface="Open Sans" panose="020B0606030504020204" pitchFamily="34" charset="0"/>
-              </a:rPr>
-              <a:t> </a:t>
-            </a:r>
-            <a:r>
-              <a:rPr sz="1400" dirty="0">
-                <a:latin typeface="Open Sans" panose="020B0606030504020204" pitchFamily="34" charset="0"/>
-                <a:ea typeface="Open Sans" panose="020B0606030504020204" pitchFamily="34" charset="0"/>
-                <a:cs typeface="Open Sans" panose="020B0606030504020204" pitchFamily="34" charset="0"/>
-              </a:rPr>
-              <a:t>regression</a:t>
-            </a:r>
-            <a:r>
-              <a:rPr sz="1400" spc="-30" dirty="0">
-                <a:latin typeface="Open Sans" panose="020B0606030504020204" pitchFamily="34" charset="0"/>
-                <a:ea typeface="Open Sans" panose="020B0606030504020204" pitchFamily="34" charset="0"/>
-                <a:cs typeface="Open Sans" panose="020B0606030504020204" pitchFamily="34" charset="0"/>
-              </a:rPr>
-              <a:t> </a:t>
-            </a:r>
-            <a:r>
-              <a:rPr sz="1400" spc="-25" dirty="0">
-                <a:latin typeface="Open Sans" panose="020B0606030504020204" pitchFamily="34" charset="0"/>
-                <a:ea typeface="Open Sans" panose="020B0606030504020204" pitchFamily="34" charset="0"/>
-                <a:cs typeface="Open Sans" panose="020B0606030504020204" pitchFamily="34" charset="0"/>
-              </a:rPr>
-              <a:t>and </a:t>
-            </a:r>
-            <a:r>
-              <a:rPr sz="1400" dirty="0">
-                <a:latin typeface="Open Sans" panose="020B0606030504020204" pitchFamily="34" charset="0"/>
-                <a:ea typeface="Open Sans" panose="020B0606030504020204" pitchFamily="34" charset="0"/>
-                <a:cs typeface="Open Sans" panose="020B0606030504020204" pitchFamily="34" charset="0"/>
-              </a:rPr>
-              <a:t>classification</a:t>
-            </a:r>
-            <a:r>
-              <a:rPr sz="1400" spc="-45" dirty="0">
-                <a:latin typeface="Open Sans" panose="020B0606030504020204" pitchFamily="34" charset="0"/>
-                <a:ea typeface="Open Sans" panose="020B0606030504020204" pitchFamily="34" charset="0"/>
-                <a:cs typeface="Open Sans" panose="020B0606030504020204" pitchFamily="34" charset="0"/>
-              </a:rPr>
-              <a:t> </a:t>
-            </a:r>
-            <a:r>
-              <a:rPr sz="1400" dirty="0">
-                <a:latin typeface="Open Sans" panose="020B0606030504020204" pitchFamily="34" charset="0"/>
-                <a:ea typeface="Open Sans" panose="020B0606030504020204" pitchFamily="34" charset="0"/>
-                <a:cs typeface="Open Sans" panose="020B0606030504020204" pitchFamily="34" charset="0"/>
-              </a:rPr>
-              <a:t>issues</a:t>
-            </a:r>
-            <a:r>
-              <a:rPr sz="1400" spc="-50" dirty="0">
-                <a:latin typeface="Open Sans" panose="020B0606030504020204" pitchFamily="34" charset="0"/>
-                <a:ea typeface="Open Sans" panose="020B0606030504020204" pitchFamily="34" charset="0"/>
-                <a:cs typeface="Open Sans" panose="020B0606030504020204" pitchFamily="34" charset="0"/>
-              </a:rPr>
-              <a:t> </a:t>
-            </a:r>
-            <a:r>
-              <a:rPr sz="1400" spc="-10" dirty="0">
-                <a:latin typeface="Open Sans" panose="020B0606030504020204" pitchFamily="34" charset="0"/>
-                <a:ea typeface="Open Sans" panose="020B0606030504020204" pitchFamily="34" charset="0"/>
-                <a:cs typeface="Open Sans" panose="020B0606030504020204" pitchFamily="34" charset="0"/>
-              </a:rPr>
-              <a:t>well.</a:t>
+              <a:t> as it is one of the simplest and popular unsupervised ML algorithms.</a:t>
             </a:r>
             <a:endParaRPr sz="1400" dirty="0">
               <a:latin typeface="Open Sans" panose="020B0606030504020204" pitchFamily="34" charset="0"/>
@@ -5813,7 +5578,7 @@
                 <a:ea typeface="Open Sans" panose="020B0606030504020204" pitchFamily="34" charset="0"/>
                 <a:cs typeface="Open Sans" panose="020B0606030504020204" pitchFamily="34" charset="0"/>
               </a:rPr>
-              <a:t>This is a regression problem, so I will also try </a:t>
+              <a:t>As a second choice , I will also try a density-based clustering algorithm such as </a:t>
             </a:r>
             <a:r>
               <a:rPr lang="en-US" sz="1400" b="1" dirty="0">
@@ -5824,7 +5589,7 @@
                 <a:ea typeface="Open Sans" panose="020B0606030504020204" pitchFamily="34" charset="0"/>
                 <a:cs typeface="Open Sans" panose="020B0606030504020204" pitchFamily="34" charset="0"/>
               </a:rPr>
-              <a:t>linear regression</a:t>
+              <a:t>DBSCAN</a:t>
             </a:r>
             <a:r>
               <a:rPr lang="en-US" sz="1400" dirty="0">
@@ -5854,12 +5619,12 @@
               </a:tabLst>
             </a:pPr>
             <a:r>
-              <a:rPr sz="1400" spc="-20" dirty="0">
+              <a:rPr lang="en-US" sz="1400" spc="-20" dirty="0">
                 <a:latin typeface="Open Sans" panose="020B0606030504020204" pitchFamily="34" charset="0"/>
                 <a:ea typeface="Open Sans" panose="020B0606030504020204" pitchFamily="34" charset="0"/>
                 <a:cs typeface="Open Sans" panose="020B0606030504020204" pitchFamily="34" charset="0"/>
               </a:rPr>
-              <a:t>A</a:t>
+              <a:t>The</a:t>
             </a:r>
             <a:r>
               <a:rPr sz="1400" spc="-80" dirty="0">
@@ -5870,28 +5635,79 @@
               <a:t> </a:t>
             </a:r>
             <a:r>
-              <a:rPr sz="1400" b="1" dirty="0">
+              <a:rPr lang="en-US" sz="1400" b="1" dirty="0">
                 <a:latin typeface="Open Sans" panose="020B0606030504020204" pitchFamily="34" charset="0"/>
                 <a:ea typeface="Open Sans" panose="020B0606030504020204" pitchFamily="34" charset="0"/>
                 <a:cs typeface="Open Sans" panose="020B0606030504020204" pitchFamily="34" charset="0"/>
               </a:rPr>
-              <a:t>gradient</a:t>
-            </a:r>
-            <a:r>
-              <a:rPr sz="1400" b="1" spc="-5" dirty="0">
+              <a:t>Gaussian Mixture Model (GMM) </a:t>
+            </a:r>
+            <a:r>
+              <a:rPr sz="1400" dirty="0">
                 <a:latin typeface="Open Sans" panose="020B0606030504020204" pitchFamily="34" charset="0"/>
                 <a:ea typeface="Open Sans" panose="020B0606030504020204" pitchFamily="34" charset="0"/>
                 <a:cs typeface="Open Sans" panose="020B0606030504020204" pitchFamily="34" charset="0"/>
               </a:rPr>
-              <a:t> </a:t>
-            </a:r>
-            <a:r>
-              <a:rPr sz="1400" b="1" dirty="0">
+              <a:t>is</a:t>
+            </a:r>
+            <a:r>
+              <a:rPr sz="1400" spc="-5" dirty="0">
                 <a:latin typeface="Open Sans" panose="020B0606030504020204" pitchFamily="34" charset="0"/>
                 <a:ea typeface="Open Sans" panose="020B0606030504020204" pitchFamily="34" charset="0"/>
                 <a:cs typeface="Open Sans" panose="020B0606030504020204" pitchFamily="34" charset="0"/>
               </a:rPr>
-              <a:t>boosting </a:t>
+              <a:t> </a:t>
+            </a:r>
+            <a:r>
+              <a:rPr sz="1400" dirty="0">
+                <a:latin typeface="Open Sans" panose="020B0606030504020204" pitchFamily="34" charset="0"/>
+                <a:ea typeface="Open Sans" panose="020B0606030504020204" pitchFamily="34" charset="0"/>
+                <a:cs typeface="Open Sans" panose="020B0606030504020204" pitchFamily="34" charset="0"/>
+              </a:rPr>
+              <a:t>my third </a:t>
+            </a:r>
+            <a:r>
+              <a:rPr sz="1400" spc="-10" dirty="0">
+                <a:latin typeface="Open Sans" panose="020B0606030504020204" pitchFamily="34" charset="0"/>
+                <a:ea typeface="Open Sans" panose="020B0606030504020204" pitchFamily="34" charset="0"/>
+                <a:cs typeface="Open Sans" panose="020B0606030504020204" pitchFamily="34" charset="0"/>
+              </a:rPr>
+              <a:t>option.</a:t>
+            </a:r>
+            <a:endParaRPr lang="en-US" sz="1400" spc="-10" dirty="0">
+              <a:latin typeface="Open Sans" panose="020B0606030504020204" pitchFamily="34" charset="0"/>
+              <a:ea typeface="Open Sans" panose="020B0606030504020204" pitchFamily="34" charset="0"/>
+              <a:cs typeface="Open Sans" panose="020B0606030504020204" pitchFamily="34" charset="0"/>
+            </a:endParaRPr>
+          </a:p>
+          <a:p>
+            <a:pPr marL="469265" indent="-361315">
+              <a:lnSpc>
+                <a:spcPct val="100000"/>
+              </a:lnSpc>
+              <a:spcBef>
+                <a:spcPts val="270"/>
+              </a:spcBef>
+              <a:buAutoNum type="arabicPeriod"/>
+              <a:tabLst>
+                <a:tab pos="469265" algn="l"/>
+              </a:tabLst>
+            </a:pPr>
+            <a:r>
+              <a:rPr lang="en-US" sz="1400" spc="-10" dirty="0">
+                <a:latin typeface="Open Sans" panose="020B0606030504020204" pitchFamily="34" charset="0"/>
+                <a:ea typeface="Open Sans" panose="020B0606030504020204" pitchFamily="34" charset="0"/>
+                <a:cs typeface="Open Sans" panose="020B0606030504020204" pitchFamily="34" charset="0"/>
+              </a:rPr>
+              <a:t>I will also use </a:t>
+            </a:r>
+            <a:r>
+              <a:rPr lang="en-US" sz="1400" b="1" dirty="0"/>
+              <a:t>Agglomerative clustering </a:t>
+            </a:r>
+            <a:r>
+              <a:rPr lang="en-US" sz="1400" dirty="0"/>
+              <a:t>and </a:t>
             </a:r>
             <a:r>
               <a:rPr lang="en-US" sz="1400" b="1" spc="-10" dirty="0">
@@ -5899,159 +5715,15 @@
                 <a:ea typeface="Open Sans" panose="020B0606030504020204" pitchFamily="34" charset="0"/>
                 <a:cs typeface="Open Sans" panose="020B0606030504020204" pitchFamily="34" charset="0"/>
               </a:rPr>
-              <a:t>regressor</a:t>
-            </a:r>
-            <a:r>
-              <a:rPr sz="1400" b="1" dirty="0">
+              <a:t>PCA</a:t>
+            </a:r>
+            <a:r>
+              <a:rPr lang="en-US" sz="1400" spc="-10" dirty="0">
                 <a:latin typeface="Open Sans" panose="020B0606030504020204" pitchFamily="34" charset="0"/>
                 <a:ea typeface="Open Sans" panose="020B0606030504020204" pitchFamily="34" charset="0"/>
                 <a:cs typeface="Open Sans" panose="020B0606030504020204" pitchFamily="34" charset="0"/>
               </a:rPr>
-              <a:t> </a:t>
-            </a:r>
-            <a:r>
-              <a:rPr sz="1400" dirty="0">
-                <a:latin typeface="Open Sans" panose="020B0606030504020204" pitchFamily="34" charset="0"/>
-                <a:ea typeface="Open Sans" panose="020B0606030504020204" pitchFamily="34" charset="0"/>
-                <a:cs typeface="Open Sans" panose="020B0606030504020204" pitchFamily="34" charset="0"/>
-              </a:rPr>
-              <a:t>is</a:t>
-            </a:r>
-            <a:r>
-              <a:rPr sz="1400" spc="-5" dirty="0">
-                <a:latin typeface="Open Sans" panose="020B0606030504020204" pitchFamily="34" charset="0"/>
-                <a:ea typeface="Open Sans" panose="020B0606030504020204" pitchFamily="34" charset="0"/>
-                <a:cs typeface="Open Sans" panose="020B0606030504020204" pitchFamily="34" charset="0"/>
-              </a:rPr>
-              <a:t> </a:t>
-            </a:r>
-            <a:r>
-              <a:rPr sz="1400" dirty="0">
-                <a:latin typeface="Open Sans" panose="020B0606030504020204" pitchFamily="34" charset="0"/>
-                <a:ea typeface="Open Sans" panose="020B0606030504020204" pitchFamily="34" charset="0"/>
-                <a:cs typeface="Open Sans" panose="020B0606030504020204" pitchFamily="34" charset="0"/>
-              </a:rPr>
-              <a:t>my third </a:t>
-            </a:r>
-            <a:r>
-              <a:rPr sz="1400" spc="-10" dirty="0">
-                <a:latin typeface="Open Sans" panose="020B0606030504020204" pitchFamily="34" charset="0"/>
-                <a:ea typeface="Open Sans" panose="020B0606030504020204" pitchFamily="34" charset="0"/>
-                <a:cs typeface="Open Sans" panose="020B0606030504020204" pitchFamily="34" charset="0"/>
-              </a:rPr>
-              <a:t>option.</a:t>
-            </a:r>
-            <a:endParaRPr sz="1400" dirty="0">
-              <a:latin typeface="Open Sans" panose="020B0606030504020204" pitchFamily="34" charset="0"/>
-              <a:ea typeface="Open Sans" panose="020B0606030504020204" pitchFamily="34" charset="0"/>
-              <a:cs typeface="Open Sans" panose="020B0606030504020204" pitchFamily="34" charset="0"/>
-            </a:endParaRPr>
-          </a:p>
-          <a:p>
-            <a:pPr marL="469900" marR="153035" indent="-361950">
-              <a:lnSpc>
-                <a:spcPct val="116100"/>
-              </a:lnSpc>
-              <a:buAutoNum type="arabicPeriod"/>
-              <a:tabLst>
-                <a:tab pos="469900" algn="l"/>
-              </a:tabLst>
-            </a:pPr>
-            <a:r>
-              <a:rPr lang="en-US" sz="1400" spc="-55" dirty="0">
-                <a:latin typeface="Open Sans" panose="020B0606030504020204" pitchFamily="34" charset="0"/>
-                <a:ea typeface="Open Sans" panose="020B0606030504020204" pitchFamily="34" charset="0"/>
-                <a:cs typeface="Open Sans" panose="020B0606030504020204" pitchFamily="34" charset="0"/>
-              </a:rPr>
-              <a:t>The </a:t>
-            </a:r>
-            <a:r>
-              <a:rPr sz="1400" b="1" dirty="0">
-                <a:latin typeface="Open Sans" panose="020B0606030504020204" pitchFamily="34" charset="0"/>
-                <a:ea typeface="Open Sans" panose="020B0606030504020204" pitchFamily="34" charset="0"/>
-                <a:cs typeface="Open Sans" panose="020B0606030504020204" pitchFamily="34" charset="0"/>
-              </a:rPr>
-              <a:t>KNN</a:t>
-            </a:r>
-            <a:r>
-              <a:rPr sz="1400" b="1" spc="-30" dirty="0">
-                <a:latin typeface="Open Sans" panose="020B0606030504020204" pitchFamily="34" charset="0"/>
-                <a:ea typeface="Open Sans" panose="020B0606030504020204" pitchFamily="34" charset="0"/>
-                <a:cs typeface="Open Sans" panose="020B0606030504020204" pitchFamily="34" charset="0"/>
-              </a:rPr>
-              <a:t> </a:t>
-            </a:r>
-            <a:r>
-              <a:rPr lang="en-US" sz="1400" b="1" dirty="0">
-                <a:latin typeface="Open Sans" panose="020B0606030504020204" pitchFamily="34" charset="0"/>
-                <a:ea typeface="Open Sans" panose="020B0606030504020204" pitchFamily="34" charset="0"/>
-                <a:cs typeface="Open Sans" panose="020B0606030504020204" pitchFamily="34" charset="0"/>
-              </a:rPr>
-              <a:t>algorithm </a:t>
-            </a:r>
-            <a:r>
-              <a:rPr lang="en-US" sz="1400" dirty="0">
-                <a:latin typeface="Open Sans" panose="020B0606030504020204" pitchFamily="34" charset="0"/>
-                <a:ea typeface="Open Sans" panose="020B0606030504020204" pitchFamily="34" charset="0"/>
-                <a:cs typeface="Open Sans" panose="020B0606030504020204" pitchFamily="34" charset="0"/>
-              </a:rPr>
-              <a:t>can look at the k-nearest nei</a:t>
-            </a:r>
-            <a:r>
-              <a:rPr lang="en-US" sz="1400" spc="-20" dirty="0">
-                <a:latin typeface="Open Sans" panose="020B0606030504020204" pitchFamily="34" charset="0"/>
-                <a:ea typeface="Open Sans" panose="020B0606030504020204" pitchFamily="34" charset="0"/>
-                <a:cs typeface="Open Sans" panose="020B0606030504020204" pitchFamily="34" charset="0"/>
-              </a:rPr>
-              <a:t>ghbors for regression</a:t>
-            </a:r>
-            <a:r>
-              <a:rPr sz="1400" spc="-20" dirty="0">
-                <a:latin typeface="Open Sans" panose="020B0606030504020204" pitchFamily="34" charset="0"/>
-                <a:ea typeface="Open Sans" panose="020B0606030504020204" pitchFamily="34" charset="0"/>
-                <a:cs typeface="Open Sans" panose="020B0606030504020204" pitchFamily="34" charset="0"/>
-              </a:rPr>
-              <a:t>.</a:t>
-            </a:r>
-            <a:endParaRPr lang="en-US" sz="1400" spc="-20" dirty="0">
-              <a:latin typeface="Open Sans" panose="020B0606030504020204" pitchFamily="34" charset="0"/>
-              <a:ea typeface="Open Sans" panose="020B0606030504020204" pitchFamily="34" charset="0"/>
-              <a:cs typeface="Open Sans" panose="020B0606030504020204" pitchFamily="34" charset="0"/>
-            </a:endParaRPr>
-          </a:p>
-          <a:p>
-            <a:pPr marL="469900" marR="153035" indent="-361950">
-              <a:lnSpc>
-                <a:spcPct val="116100"/>
-              </a:lnSpc>
-              <a:buAutoNum type="arabicPeriod"/>
-              <a:tabLst>
-                <a:tab pos="469900" algn="l"/>
-              </a:tabLst>
-            </a:pPr>
-            <a:r>
-              <a:rPr lang="en-US" sz="1400" spc="-20" dirty="0">
-                <a:latin typeface="Open Sans" panose="020B0606030504020204" pitchFamily="34" charset="0"/>
-                <a:ea typeface="Open Sans" panose="020B0606030504020204" pitchFamily="34" charset="0"/>
-                <a:cs typeface="Open Sans" panose="020B0606030504020204" pitchFamily="34" charset="0"/>
-              </a:rPr>
-              <a:t>As a final model, I will try a </a:t>
-            </a:r>
-            <a:r>
-              <a:rPr lang="en-US" sz="1400" b="1" spc="-20" dirty="0">
-                <a:latin typeface="Open Sans" panose="020B0606030504020204" pitchFamily="34" charset="0"/>
-                <a:ea typeface="Open Sans" panose="020B0606030504020204" pitchFamily="34" charset="0"/>
-                <a:cs typeface="Open Sans" panose="020B0606030504020204" pitchFamily="34" charset="0"/>
-              </a:rPr>
-              <a:t>Support Vector Regressor</a:t>
-            </a:r>
-            <a:r>
-              <a:rPr lang="en-US" sz="1400" spc="-20" dirty="0">
-                <a:latin typeface="Open Sans" panose="020B0606030504020204" pitchFamily="34" charset="0"/>
-                <a:ea typeface="Open Sans" panose="020B0606030504020204" pitchFamily="34" charset="0"/>
-                <a:cs typeface="Open Sans" panose="020B0606030504020204" pitchFamily="34" charset="0"/>
-              </a:rPr>
-              <a:t>.</a:t>
+              <a:t> for dimensionality reduction and visualization.</a:t>
             </a:r>
             <a:endParaRPr sz="1400" dirty="0">
               <a:latin typeface="Open Sans" panose="020B0606030504020204" pitchFamily="34" charset="0"/>
@@ -6363,11 +6035,6 @@
               </a:rPr>
               <a:t>Gaussian Mixture Model</a:t>
             </a:r>
-            <a:endParaRPr sz="1800" dirty="0">
-              <a:latin typeface="Open Sans" panose="020B0606030504020204" pitchFamily="34" charset="0"/>
-              <a:ea typeface="Open Sans" panose="020B0606030504020204" pitchFamily="34" charset="0"/>
-              <a:cs typeface="Open Sans" panose="020B0606030504020204" pitchFamily="34" charset="0"/>
-            </a:endParaRPr>
           </a:p>
           <a:p>
             <a:pPr marL="2323465" indent="-400050">
@@ -6414,124 +6081,12 @@
               </a:lnSpc>
             </a:pPr>
             <a:r>
-              <a:rPr sz="1400" dirty="0">
-                <a:latin typeface="Open Sans" panose="020B0606030504020204" pitchFamily="34" charset="0"/>
-                <a:ea typeface="Open Sans" panose="020B0606030504020204" pitchFamily="34" charset="0"/>
-                <a:cs typeface="Open Sans" panose="020B0606030504020204" pitchFamily="34" charset="0"/>
-              </a:rPr>
-              <a:t>I</a:t>
-            </a:r>
-            <a:r>
-              <a:rPr sz="1400" spc="-25" dirty="0">
-                <a:latin typeface="Open Sans" panose="020B0606030504020204" pitchFamily="34" charset="0"/>
-                <a:ea typeface="Open Sans" panose="020B0606030504020204" pitchFamily="34" charset="0"/>
-                <a:cs typeface="Open Sans" panose="020B0606030504020204" pitchFamily="34" charset="0"/>
-              </a:rPr>
-              <a:t> </a:t>
-            </a:r>
-            <a:r>
-              <a:rPr sz="1400" dirty="0">
-                <a:latin typeface="Open Sans" panose="020B0606030504020204" pitchFamily="34" charset="0"/>
-                <a:ea typeface="Open Sans" panose="020B0606030504020204" pitchFamily="34" charset="0"/>
-                <a:cs typeface="Open Sans" panose="020B0606030504020204" pitchFamily="34" charset="0"/>
-              </a:rPr>
-              <a:t>built</a:t>
-            </a:r>
-            <a:r>
-              <a:rPr sz="1400" spc="-25" dirty="0">
-                <a:latin typeface="Open Sans" panose="020B0606030504020204" pitchFamily="34" charset="0"/>
-                <a:ea typeface="Open Sans" panose="020B0606030504020204" pitchFamily="34" charset="0"/>
-                <a:cs typeface="Open Sans" panose="020B0606030504020204" pitchFamily="34" charset="0"/>
-              </a:rPr>
-              <a:t> </a:t>
-            </a:r>
-            <a:r>
               <a:rPr lang="en-US" sz="1400" dirty="0">
                 <a:latin typeface="Open Sans" panose="020B0606030504020204" pitchFamily="34" charset="0"/>
                 <a:ea typeface="Open Sans" panose="020B0606030504020204" pitchFamily="34" charset="0"/>
                 <a:cs typeface="Open Sans" panose="020B0606030504020204" pitchFamily="34" charset="0"/>
               </a:rPr>
-              <a:t>an optimized version the Gradient Boosting Regressor </a:t>
-            </a:r>
-            <a:r>
-              <a:rPr sz="1400" dirty="0">
-                <a:latin typeface="Open Sans" panose="020B0606030504020204" pitchFamily="34" charset="0"/>
-                <a:ea typeface="Open Sans" panose="020B0606030504020204" pitchFamily="34" charset="0"/>
-                <a:cs typeface="Open Sans" panose="020B0606030504020204" pitchFamily="34" charset="0"/>
-              </a:rPr>
-              <a:t>using</a:t>
-            </a:r>
-            <a:r>
-              <a:rPr sz="1400" spc="-20" dirty="0">
-                <a:latin typeface="Open Sans" panose="020B0606030504020204" pitchFamily="34" charset="0"/>
-                <a:ea typeface="Open Sans" panose="020B0606030504020204" pitchFamily="34" charset="0"/>
-                <a:cs typeface="Open Sans" panose="020B0606030504020204" pitchFamily="34" charset="0"/>
-              </a:rPr>
-              <a:t> </a:t>
-            </a:r>
-            <a:r>
-              <a:rPr sz="1400" spc="-10" dirty="0">
-                <a:latin typeface="Open Sans" panose="020B0606030504020204" pitchFamily="34" charset="0"/>
-                <a:ea typeface="Open Sans" panose="020B0606030504020204" pitchFamily="34" charset="0"/>
-                <a:cs typeface="Open Sans" panose="020B0606030504020204" pitchFamily="34" charset="0"/>
-              </a:rPr>
-              <a:t>parameters</a:t>
-            </a:r>
-            <a:r>
-              <a:rPr sz="1400" spc="-30" dirty="0">
-                <a:latin typeface="Open Sans" panose="020B0606030504020204" pitchFamily="34" charset="0"/>
-                <a:ea typeface="Open Sans" panose="020B0606030504020204" pitchFamily="34" charset="0"/>
-                <a:cs typeface="Open Sans" panose="020B0606030504020204" pitchFamily="34" charset="0"/>
-              </a:rPr>
-              <a:t> </a:t>
-            </a:r>
-            <a:r>
-              <a:rPr sz="1400" dirty="0">
-                <a:latin typeface="Open Sans" panose="020B0606030504020204" pitchFamily="34" charset="0"/>
-                <a:ea typeface="Open Sans" panose="020B0606030504020204" pitchFamily="34" charset="0"/>
-                <a:cs typeface="Open Sans" panose="020B0606030504020204" pitchFamily="34" charset="0"/>
-              </a:rPr>
-              <a:t>suggested</a:t>
-            </a:r>
-            <a:r>
-              <a:rPr sz="1400" spc="-20" dirty="0">
-                <a:latin typeface="Open Sans" panose="020B0606030504020204" pitchFamily="34" charset="0"/>
-                <a:ea typeface="Open Sans" panose="020B0606030504020204" pitchFamily="34" charset="0"/>
-                <a:cs typeface="Open Sans" panose="020B0606030504020204" pitchFamily="34" charset="0"/>
-              </a:rPr>
-              <a:t> </a:t>
-            </a:r>
-            <a:r>
-              <a:rPr sz="1400" dirty="0">
-                <a:latin typeface="Open Sans" panose="020B0606030504020204" pitchFamily="34" charset="0"/>
-                <a:ea typeface="Open Sans" panose="020B0606030504020204" pitchFamily="34" charset="0"/>
-                <a:cs typeface="Open Sans" panose="020B0606030504020204" pitchFamily="34" charset="0"/>
-              </a:rPr>
-              <a:t>by</a:t>
-            </a:r>
-            <a:r>
-              <a:rPr sz="1400" spc="-25" dirty="0">
-                <a:latin typeface="Open Sans" panose="020B0606030504020204" pitchFamily="34" charset="0"/>
-                <a:ea typeface="Open Sans" panose="020B0606030504020204" pitchFamily="34" charset="0"/>
-                <a:cs typeface="Open Sans" panose="020B0606030504020204" pitchFamily="34" charset="0"/>
-              </a:rPr>
-              <a:t> </a:t>
-            </a:r>
-            <a:r>
-              <a:rPr sz="1400" spc="-10" dirty="0" err="1">
-                <a:latin typeface="Open Sans" panose="020B0606030504020204" pitchFamily="34" charset="0"/>
-                <a:ea typeface="Open Sans" panose="020B0606030504020204" pitchFamily="34" charset="0"/>
-                <a:cs typeface="Open Sans" panose="020B0606030504020204" pitchFamily="34" charset="0"/>
-              </a:rPr>
-              <a:t>GridSearchCV</a:t>
-            </a:r>
-            <a:r>
-              <a:rPr lang="en-US" sz="1400" spc="-10" dirty="0">
-                <a:latin typeface="Open Sans" panose="020B0606030504020204" pitchFamily="34" charset="0"/>
-                <a:ea typeface="Open Sans" panose="020B0606030504020204" pitchFamily="34" charset="0"/>
-                <a:cs typeface="Open Sans" panose="020B0606030504020204" pitchFamily="34" charset="0"/>
-              </a:rPr>
-              <a:t>. However, it didn’t beat the KNN Regressor.</a:t>
+              <a:t>Both K-Means and Gaussian Mixture Model accurately split customers into four groups. DBSCAN  </a:t>
             </a:r>
             <a:endParaRPr sz="1400" dirty="0">
               <a:latin typeface="Times New Roman"/>
@@ -7438,7 +6993,7 @@
         </p:nvSpPr>
         <p:spPr>
           <a:xfrm>
-            <a:off x="384725" y="467785"/>
+            <a:off x="376568" y="199443"/>
             <a:ext cx="8301990" cy="443711"/>
           </a:xfrm>
           <a:prstGeom prst="rect">
@@ -7461,7 +7016,7 @@
             </a:pPr>
             <a:r>
               <a:rPr lang="en-US" sz="2800" spc="-20" dirty="0"/>
-              <a:t>Model Preparation</a:t>
+              <a:t>Model Results</a:t>
             </a:r>
             <a:r>
               <a:rPr lang="en-US" sz="2800" spc="-70" dirty="0"/>
@@ -7473,9 +7028,9 @@
             </a:r>
             <a:r>
               <a:rPr lang="en-US" sz="2800" spc="-105" dirty="0"/>
-              <a:t>beating the established baseline</a:t>
-            </a:r>
-            <a:endParaRPr sz="2800" spc="110" dirty="0"/>
+              <a:t>Silhouette Score of Gaussian Mixture </a:t>
+            </a:r>
+            <a:endParaRPr sz="2800" spc="-20" dirty="0"/>
           </a:p>
         </p:txBody>
       </p:sp>
@@ -7599,13 +7154,17 @@
       <p:sp>
         <p:nvSpPr>
           <p:cNvPr id="6" name="object 6"/>
-          <p:cNvSpPr txBox="1"/>
-          <p:nvPr/>
+          <p:cNvSpPr txBox="1">
+            <a:spLocks noGrp="1"/>
+          </p:cNvSpPr>
+          <p:nvPr>
+            <p:ph type="body" idx="1"/>
+          </p:nvPr>
         </p:nvSpPr>
         <p:spPr>
           <a:xfrm>
-            <a:off x="1143000" y="1893189"/>
-            <a:ext cx="6549390" cy="1890261"/>
+            <a:off x="1275093" y="1785213"/>
+            <a:ext cx="6504940" cy="228268"/>
           </a:xfrm>
           <a:prstGeom prst="rect">
             <a:avLst/>
@@ -7631,143 +7190,7 @@
               <a:buFont typeface="Open Sans"/>
               <a:buChar char="●"/>
             </a:pPr>
-            <a:r>
-              <a:rPr lang="en-US" sz="1600" dirty="0">
-                <a:latin typeface="Open Sans" panose="020B0606030504020204" pitchFamily="34" charset="0"/>
-                <a:ea typeface="Open Sans" panose="020B0606030504020204" pitchFamily="34" charset="0"/>
-                <a:cs typeface="Open Sans" panose="020B0606030504020204" pitchFamily="34" charset="0"/>
-              </a:rPr>
-              <a:t>MAE of KNN Regressor in the Training Set: </a:t>
-            </a:r>
-            <a:r>
-              <a:rPr lang="en-US" sz="1600" b="1" dirty="0">
-                <a:latin typeface="Open Sans" panose="020B0606030504020204" pitchFamily="34" charset="0"/>
-                <a:ea typeface="Open Sans" panose="020B0606030504020204" pitchFamily="34" charset="0"/>
-                <a:cs typeface="Open Sans" panose="020B0606030504020204" pitchFamily="34" charset="0"/>
-              </a:rPr>
-              <a:t>0.21 </a:t>
-            </a:r>
-            <a:r>
-              <a:rPr lang="en-US" sz="1600" dirty="0">
-                <a:latin typeface="Open Sans" panose="020B0606030504020204" pitchFamily="34" charset="0"/>
-                <a:ea typeface="Open Sans" panose="020B0606030504020204" pitchFamily="34" charset="0"/>
-                <a:cs typeface="Open Sans" panose="020B0606030504020204" pitchFamily="34" charset="0"/>
-              </a:rPr>
-              <a:t>degrees</a:t>
-            </a:r>
-            <a:endParaRPr lang="en-US" sz="1600" b="1" dirty="0">
-              <a:latin typeface="Open Sans" panose="020B0606030504020204" pitchFamily="34" charset="0"/>
-              <a:ea typeface="Open Sans" panose="020B0606030504020204" pitchFamily="34" charset="0"/>
-              <a:cs typeface="Open Sans" panose="020B0606030504020204" pitchFamily="34" charset="0"/>
-            </a:endParaRPr>
-          </a:p>
-          <a:p>
-            <a:pPr marL="457200" indent="-342900" algn="l" rtl="0">
-              <a:buClr>
-                <a:schemeClr val="dk1"/>
-              </a:buClr>
-              <a:buSzPts val="1800"/>
-              <a:buFont typeface="Open Sans"/>
-              <a:buChar char="●"/>
-            </a:pPr>
-            <a:r>
-              <a:rPr lang="en-US" sz="1600" dirty="0">
-                <a:latin typeface="Open Sans" panose="020B0606030504020204" pitchFamily="34" charset="0"/>
-                <a:ea typeface="Open Sans" panose="020B0606030504020204" pitchFamily="34" charset="0"/>
-                <a:cs typeface="Open Sans" panose="020B0606030504020204" pitchFamily="34" charset="0"/>
-              </a:rPr>
-              <a:t>MAE of KNN Regressor in the Test Set: </a:t>
-            </a:r>
-            <a:r>
-              <a:rPr lang="en-US" sz="1600" b="1" dirty="0">
-                <a:latin typeface="Open Sans" panose="020B0606030504020204" pitchFamily="34" charset="0"/>
-                <a:ea typeface="Open Sans" panose="020B0606030504020204" pitchFamily="34" charset="0"/>
-                <a:cs typeface="Open Sans" panose="020B0606030504020204" pitchFamily="34" charset="0"/>
-              </a:rPr>
-              <a:t>0.24 </a:t>
-            </a:r>
-            <a:r>
-              <a:rPr lang="en-US" sz="1600" dirty="0">
-                <a:latin typeface="Open Sans" panose="020B0606030504020204" pitchFamily="34" charset="0"/>
-                <a:ea typeface="Open Sans" panose="020B0606030504020204" pitchFamily="34" charset="0"/>
-                <a:cs typeface="Open Sans" panose="020B0606030504020204" pitchFamily="34" charset="0"/>
-              </a:rPr>
-              <a:t>degrees</a:t>
-            </a:r>
-            <a:endParaRPr lang="en-US" sz="1600" b="1" dirty="0">
-              <a:latin typeface="Open Sans" panose="020B0606030504020204" pitchFamily="34" charset="0"/>
-              <a:ea typeface="Open Sans" panose="020B0606030504020204" pitchFamily="34" charset="0"/>
-              <a:cs typeface="Open Sans" panose="020B0606030504020204" pitchFamily="34" charset="0"/>
-            </a:endParaRPr>
-          </a:p>
-          <a:p>
-            <a:pPr marL="457200" lvl="0" indent="-342900" algn="l" rtl="0">
-              <a:spcBef>
-                <a:spcPts val="0"/>
-              </a:spcBef>
-              <a:spcAft>
-                <a:spcPts val="0"/>
-              </a:spcAft>
-              <a:buClr>
-                <a:schemeClr val="dk1"/>
-              </a:buClr>
-              <a:buSzPts val="1800"/>
-              <a:buFont typeface="Open Sans"/>
-              <a:buChar char="●"/>
-            </a:pPr>
-            <a:r>
-              <a:rPr lang="en-US" sz="1600" dirty="0">
-                <a:latin typeface="Open Sans" panose="020B0606030504020204" pitchFamily="34" charset="0"/>
-                <a:ea typeface="Open Sans" panose="020B0606030504020204" pitchFamily="34" charset="0"/>
-                <a:cs typeface="Open Sans" panose="020B0606030504020204" pitchFamily="34" charset="0"/>
-              </a:rPr>
-              <a:t>MAE of the established baseline: </a:t>
-            </a:r>
-            <a:r>
-              <a:rPr lang="en-US" sz="1600" b="1" dirty="0">
-                <a:latin typeface="Open Sans" panose="020B0606030504020204" pitchFamily="34" charset="0"/>
-                <a:ea typeface="Open Sans" panose="020B0606030504020204" pitchFamily="34" charset="0"/>
-                <a:cs typeface="Open Sans" panose="020B0606030504020204" pitchFamily="34" charset="0"/>
-              </a:rPr>
-              <a:t>2.03</a:t>
-            </a:r>
-            <a:r>
-              <a:rPr lang="en-US" sz="1600" dirty="0">
-                <a:latin typeface="Open Sans" panose="020B0606030504020204" pitchFamily="34" charset="0"/>
-                <a:ea typeface="Open Sans" panose="020B0606030504020204" pitchFamily="34" charset="0"/>
-                <a:cs typeface="Open Sans" panose="020B0606030504020204" pitchFamily="34" charset="0"/>
-              </a:rPr>
-              <a:t> degrees </a:t>
-            </a:r>
-          </a:p>
-          <a:p>
-            <a:pPr marL="457200" lvl="0" indent="-342900" algn="l" rtl="0">
-              <a:spcBef>
-                <a:spcPts val="0"/>
-              </a:spcBef>
-              <a:spcAft>
-                <a:spcPts val="0"/>
-              </a:spcAft>
-              <a:buClr>
-                <a:schemeClr val="dk1"/>
-              </a:buClr>
-              <a:buSzPts val="1800"/>
-              <a:buFont typeface="Open Sans"/>
-              <a:buChar char="●"/>
-            </a:pPr>
-            <a:r>
-              <a:rPr lang="en-US" sz="1600" dirty="0">
-                <a:solidFill>
-                  <a:schemeClr val="dk1"/>
-                </a:solidFill>
-                <a:latin typeface="Open Sans" panose="020B0606030504020204" pitchFamily="34" charset="0"/>
-                <a:ea typeface="Open Sans" panose="020B0606030504020204" pitchFamily="34" charset="0"/>
-                <a:cs typeface="Open Sans" panose="020B0606030504020204" pitchFamily="34" charset="0"/>
-                <a:sym typeface="Open Sans"/>
-              </a:rPr>
-              <a:t>Therefore, it was worthwhile to use machine learning algorithms on this regression problem.</a:t>
-            </a:r>
-            <a:endParaRPr lang="en-US" sz="1600" dirty="0">
+            <a:endParaRPr lang="en-US" sz="1400" b="0" dirty="0">
               <a:solidFill>
                 <a:schemeClr val="dk1"/>
               </a:solidFill>
@@ -7776,6 +7199,360 @@
               <a:cs typeface="Open Sans"/>
               <a:sym typeface="Open Sans"/>
             </a:endParaRPr>
+          </a:p>
+        </p:txBody>
+      </p:sp>
+      <p:pic>
+        <p:nvPicPr>
+          <p:cNvPr id="8" name="Picture 7" descr="A graph with a red line and blue line&#10;&#10;Description automatically generated">
+            <a:extLst>
+              <a:ext uri="{FF2B5EF4-FFF2-40B4-BE49-F238E27FC236}">
+                <a16:creationId xmlns:a16="http://schemas.microsoft.com/office/drawing/2014/main" id="{0798B70B-908B-88E2-0036-B6DDDA77E441}"/>
+              </a:ext>
+            </a:extLst>
+          </p:cNvPr>
+          <p:cNvPicPr>
+            <a:picLocks noChangeAspect="1"/>
+          </p:cNvPicPr>
+          <p:nvPr/>
+        </p:nvPicPr>
+        <p:blipFill>
+          <a:blip r:embed="rId2">
+            <a:extLst>
+              <a:ext uri="{28A0092B-C50C-407E-A947-70E740481C1C}">
+                <a14:useLocalDpi xmlns:a14="http://schemas.microsoft.com/office/drawing/2010/main" val="0"/>
+              </a:ext>
+            </a:extLst>
+          </a:blip>
+          <a:stretch>
+            <a:fillRect/>
+          </a:stretch>
+        </p:blipFill>
+        <p:spPr>
+          <a:xfrm>
+            <a:off x="374128" y="742950"/>
+            <a:ext cx="8395744" cy="4094857"/>
+          </a:xfrm>
+          <a:prstGeom prst="rect">
+            <a:avLst/>
+          </a:prstGeom>
+        </p:spPr>
+      </p:pic>
+    </p:spTree>
+    <p:extLst>
+      <p:ext uri="{BB962C8B-B14F-4D97-AF65-F5344CB8AC3E}">
+        <p14:creationId xmlns:p14="http://schemas.microsoft.com/office/powerpoint/2010/main" val="192443794"/>
+      </p:ext>
+    </p:extLst>
+  </p:cSld>
+  <p:clrMapOvr>
+    <a:masterClrMapping/>
+  </p:clrMapOvr>
+</p:sld>
+</file>
+
+<file path=ppt/slides/slide26.xml><?xml version="1.0" encoding="utf-8"?>
+<p:sld xmlns:a="http://schemas.openxmlformats.org/drawingml/2006/main" xmlns:r="http://schemas.openxmlformats.org/officeDocument/2006/relationships" xmlns:p="http://schemas.openxmlformats.org/presentationml/2006/main" showMasterSp="0">
+  <p:cSld>
+    <p:spTree>
+      <p:nvGrpSpPr>
+        <p:cNvPr id="1" name=""/>
+        <p:cNvGrpSpPr/>
+        <p:nvPr/>
+      </p:nvGrpSpPr>
+      <p:grpSpPr>
+        <a:xfrm>
+          <a:off x="0" y="0"/>
+          <a:ext cx="0" cy="0"/>
+          <a:chOff x="0" y="0"/>
+          <a:chExt cx="0" cy="0"/>
+        </a:xfrm>
+      </p:grpSpPr>
+      <p:sp>
+        <p:nvSpPr>
+          <p:cNvPr id="2" name="object 2"/>
+          <p:cNvSpPr txBox="1">
+            <a:spLocks noGrp="1"/>
+          </p:cNvSpPr>
+          <p:nvPr>
+            <p:ph type="title"/>
+          </p:nvPr>
+        </p:nvSpPr>
+        <p:spPr>
+          <a:xfrm>
+            <a:off x="384725" y="467785"/>
+            <a:ext cx="8301990" cy="443711"/>
+          </a:xfrm>
+          <a:prstGeom prst="rect">
+            <a:avLst/>
+          </a:prstGeom>
+        </p:spPr>
+        <p:txBody>
+          <a:bodyPr vert="horz" wrap="square" lIns="0" tIns="12700" rIns="0" bIns="0" rtlCol="0">
+            <a:spAutoFit/>
+          </a:bodyPr>
+          <a:lstStyle/>
+          <a:p>
+            <a:pPr marL="12700">
+              <a:lnSpc>
+                <a:spcPct val="100000"/>
+              </a:lnSpc>
+              <a:spcBef>
+                <a:spcPts val="100"/>
+              </a:spcBef>
+            </a:pPr>
+            <a:r>
+              <a:rPr lang="en-US" sz="2800" spc="-20" dirty="0"/>
+              <a:t>Model Results</a:t>
+            </a:r>
+            <a:r>
+              <a:rPr lang="en-US" sz="2800" spc="-70" dirty="0"/>
+              <a:t>:</a:t>
+            </a:r>
+            <a:r>
+              <a:rPr lang="en-US" sz="2800" spc="-114" dirty="0"/>
+              <a:t> </a:t>
+            </a:r>
+            <a:r>
+              <a:rPr lang="en-US" sz="2800" spc="-105" dirty="0"/>
+              <a:t>verified my heuristic</a:t>
+            </a:r>
+            <a:endParaRPr sz="2800" spc="110" dirty="0"/>
+          </a:p>
+        </p:txBody>
+      </p:sp>
+      <p:grpSp>
+        <p:nvGrpSpPr>
+          <p:cNvPr id="3" name="object 3"/>
+          <p:cNvGrpSpPr/>
+          <p:nvPr/>
+        </p:nvGrpSpPr>
+        <p:grpSpPr>
+          <a:xfrm>
+            <a:off x="693875" y="1212987"/>
+            <a:ext cx="7613650" cy="3426460"/>
+            <a:chOff x="693875" y="1212987"/>
+            <a:chExt cx="7613650" cy="3426460"/>
+          </a:xfrm>
+        </p:grpSpPr>
+        <p:sp>
+          <p:nvSpPr>
+            <p:cNvPr id="4" name="object 4"/>
+            <p:cNvSpPr/>
+            <p:nvPr/>
+          </p:nvSpPr>
+          <p:spPr>
+            <a:xfrm>
+              <a:off x="698566" y="1217750"/>
+              <a:ext cx="7604125" cy="464184"/>
+            </a:xfrm>
+            <a:custGeom>
+              <a:avLst/>
+              <a:gdLst/>
+              <a:ahLst/>
+              <a:cxnLst/>
+              <a:rect l="l" t="t" r="r" b="b"/>
+              <a:pathLst>
+                <a:path w="7604125" h="464185">
+                  <a:moveTo>
+                    <a:pt x="7604093" y="464099"/>
+                  </a:moveTo>
+                  <a:lnTo>
+                    <a:pt x="0" y="464099"/>
+                  </a:lnTo>
+                  <a:lnTo>
+                    <a:pt x="0" y="0"/>
+                  </a:lnTo>
+                  <a:lnTo>
+                    <a:pt x="7604093" y="0"/>
+                  </a:lnTo>
+                  <a:lnTo>
+                    <a:pt x="7604093" y="464099"/>
+                  </a:lnTo>
+                  <a:close/>
+                </a:path>
+              </a:pathLst>
+            </a:custGeom>
+            <a:solidFill>
+              <a:srgbClr val="2A3890"/>
+            </a:solidFill>
+          </p:spPr>
+          <p:txBody>
+            <a:bodyPr wrap="square" lIns="0" tIns="0" rIns="0" bIns="0" rtlCol="0"/>
+            <a:lstStyle/>
+            <a:p>
+              <a:endParaRPr/>
+            </a:p>
+          </p:txBody>
+        </p:sp>
+        <p:sp>
+          <p:nvSpPr>
+            <p:cNvPr id="5" name="object 5"/>
+            <p:cNvSpPr/>
+            <p:nvPr/>
+          </p:nvSpPr>
+          <p:spPr>
+            <a:xfrm>
+              <a:off x="698638" y="1217750"/>
+              <a:ext cx="7604125" cy="3416935"/>
+            </a:xfrm>
+            <a:custGeom>
+              <a:avLst/>
+              <a:gdLst/>
+              <a:ahLst/>
+              <a:cxnLst/>
+              <a:rect l="l" t="t" r="r" b="b"/>
+              <a:pathLst>
+                <a:path w="7604125" h="3416935">
+                  <a:moveTo>
+                    <a:pt x="0" y="0"/>
+                  </a:moveTo>
+                  <a:lnTo>
+                    <a:pt x="7604092" y="0"/>
+                  </a:lnTo>
+                  <a:lnTo>
+                    <a:pt x="7604092" y="3416399"/>
+                  </a:lnTo>
+                  <a:lnTo>
+                    <a:pt x="0" y="3416399"/>
+                  </a:lnTo>
+                  <a:lnTo>
+                    <a:pt x="0" y="0"/>
+                  </a:lnTo>
+                  <a:close/>
+                </a:path>
+              </a:pathLst>
+            </a:custGeom>
+            <a:ln w="9524">
+              <a:solidFill>
+                <a:srgbClr val="2A3890"/>
+              </a:solidFill>
+            </a:ln>
+          </p:spPr>
+          <p:txBody>
+            <a:bodyPr wrap="square" lIns="0" tIns="0" rIns="0" bIns="0" rtlCol="0"/>
+            <a:lstStyle/>
+            <a:p>
+              <a:endParaRPr/>
+            </a:p>
+          </p:txBody>
+        </p:sp>
+      </p:grpSp>
+      <p:sp>
+        <p:nvSpPr>
+          <p:cNvPr id="6" name="object 6"/>
+          <p:cNvSpPr txBox="1"/>
+          <p:nvPr/>
+        </p:nvSpPr>
+        <p:spPr>
+          <a:xfrm>
+            <a:off x="1143000" y="1893189"/>
+            <a:ext cx="6549390" cy="2382704"/>
+          </a:xfrm>
+          <a:prstGeom prst="rect">
+            <a:avLst/>
+          </a:prstGeom>
+        </p:spPr>
+        <p:txBody>
+          <a:bodyPr vert="horz" wrap="square" lIns="0" tIns="12700" rIns="0" bIns="0" rtlCol="0">
+            <a:spAutoFit/>
+          </a:bodyPr>
+          <a:lstStyle/>
+          <a:p>
+            <a:pPr marL="457200" lvl="0" indent="-342900" algn="l" rtl="0">
+              <a:spcBef>
+                <a:spcPts val="0"/>
+              </a:spcBef>
+              <a:spcAft>
+                <a:spcPts val="0"/>
+              </a:spcAft>
+              <a:buClr>
+                <a:schemeClr val="dk1"/>
+              </a:buClr>
+              <a:buSzPts val="1800"/>
+              <a:buFont typeface="Open Sans"/>
+              <a:buChar char="●"/>
+            </a:pPr>
+            <a:r>
+              <a:rPr lang="en-US" sz="1600" dirty="0">
+                <a:latin typeface="Open Sans" panose="020B0606030504020204" pitchFamily="34" charset="0"/>
+                <a:ea typeface="Open Sans" panose="020B0606030504020204" pitchFamily="34" charset="0"/>
+                <a:cs typeface="Open Sans" panose="020B0606030504020204" pitchFamily="34" charset="0"/>
+              </a:rPr>
+              <a:t>Both K-Means and GMM gave favorable results with four clusters. </a:t>
+            </a:r>
+          </a:p>
+          <a:p>
+            <a:pPr marL="457200" lvl="0" indent="-342900" algn="l" rtl="0">
+              <a:spcBef>
+                <a:spcPts val="0"/>
+              </a:spcBef>
+              <a:spcAft>
+                <a:spcPts val="0"/>
+              </a:spcAft>
+              <a:buClr>
+                <a:schemeClr val="dk1"/>
+              </a:buClr>
+              <a:buSzPts val="1800"/>
+              <a:buFont typeface="Open Sans"/>
+              <a:buChar char="●"/>
+            </a:pPr>
+            <a:r>
+              <a:rPr lang="en-US" sz="1600" dirty="0">
+                <a:latin typeface="Open Sans" panose="020B0606030504020204" pitchFamily="34" charset="0"/>
+                <a:ea typeface="Open Sans" panose="020B0606030504020204" pitchFamily="34" charset="0"/>
+                <a:cs typeface="Open Sans" panose="020B0606030504020204" pitchFamily="34" charset="0"/>
+              </a:rPr>
+              <a:t>Customers with low annual income generally have a low spending score.</a:t>
+            </a:r>
+          </a:p>
+          <a:p>
+            <a:pPr marL="457200" lvl="0" indent="-342900" algn="l" rtl="0">
+              <a:spcBef>
+                <a:spcPts val="0"/>
+              </a:spcBef>
+              <a:spcAft>
+                <a:spcPts val="0"/>
+              </a:spcAft>
+              <a:buClr>
+                <a:schemeClr val="dk1"/>
+              </a:buClr>
+              <a:buSzPts val="1800"/>
+              <a:buFont typeface="Open Sans"/>
+              <a:buChar char="●"/>
+            </a:pPr>
+            <a:r>
+              <a:rPr lang="en-US" sz="1600" dirty="0">
+                <a:latin typeface="Open Sans" panose="020B0606030504020204" pitchFamily="34" charset="0"/>
+                <a:ea typeface="Open Sans" panose="020B0606030504020204" pitchFamily="34" charset="0"/>
+                <a:cs typeface="Open Sans" panose="020B0606030504020204" pitchFamily="34" charset="0"/>
+              </a:rPr>
+              <a:t>Customers with a higher annual income have a higher spending score.</a:t>
+            </a:r>
+          </a:p>
+          <a:p>
+            <a:pPr marL="457200" lvl="0" indent="-342900" algn="l" rtl="0">
+              <a:spcBef>
+                <a:spcPts val="0"/>
+              </a:spcBef>
+              <a:spcAft>
+                <a:spcPts val="0"/>
+              </a:spcAft>
+              <a:buClr>
+                <a:schemeClr val="dk1"/>
+              </a:buClr>
+              <a:buSzPts val="1800"/>
+              <a:buFont typeface="Open Sans"/>
+              <a:buChar char="●"/>
+            </a:pPr>
+            <a:r>
+              <a:rPr lang="en-US" sz="1600" dirty="0">
+                <a:latin typeface="Open Sans" panose="020B0606030504020204" pitchFamily="34" charset="0"/>
+                <a:ea typeface="Open Sans" panose="020B0606030504020204" pitchFamily="34" charset="0"/>
+                <a:cs typeface="Open Sans" panose="020B0606030504020204" pitchFamily="34" charset="0"/>
+              </a:rPr>
+              <a:t>Older customers have a higher spending score.</a:t>
+            </a:r>
           </a:p>
           <a:p>
             <a:pPr marL="457200" lvl="0" indent="-342900" algn="l" rtl="0">
@@ -7867,7 +7644,7 @@
 </p:sld>
 </file>
 
-<file path=ppt/slides/slide26.xml><?xml version="1.0" encoding="utf-8"?>
+<file path=ppt/slides/slide27.xml><?xml version="1.0" encoding="utf-8"?>
 <p:sld xmlns:a="http://schemas.openxmlformats.org/drawingml/2006/main" xmlns:r="http://schemas.openxmlformats.org/officeDocument/2006/relationships" xmlns:p="http://schemas.openxmlformats.org/presentationml/2006/main">
   <p:cSld>
     <p:spTree>
@@ -7930,369 +7707,6 @@
         </p:txBody>
       </p:sp>
     </p:spTree>
-  </p:cSld>
-  <p:clrMapOvr>
-    <a:masterClrMapping/>
-  </p:clrMapOvr>
-</p:sld>
-</file>
-
-<file path=ppt/slides/slide27.xml><?xml version="1.0" encoding="utf-8"?>
-<p:sld xmlns:a="http://schemas.openxmlformats.org/drawingml/2006/main" xmlns:r="http://schemas.openxmlformats.org/officeDocument/2006/relationships" xmlns:p="http://schemas.openxmlformats.org/presentationml/2006/main" showMasterSp="0">
-  <p:cSld>
-    <p:spTree>
-      <p:nvGrpSpPr>
-        <p:cNvPr id="1" name=""/>
-        <p:cNvGrpSpPr/>
-        <p:nvPr/>
-      </p:nvGrpSpPr>
-      <p:grpSpPr>
-        <a:xfrm>
-          <a:off x="0" y="0"/>
-          <a:ext cx="0" cy="0"/>
-          <a:chOff x="0" y="0"/>
-          <a:chExt cx="0" cy="0"/>
-        </a:xfrm>
-      </p:grpSpPr>
-      <p:sp>
-        <p:nvSpPr>
-          <p:cNvPr id="2" name="object 2"/>
-          <p:cNvSpPr txBox="1">
-            <a:spLocks noGrp="1"/>
-          </p:cNvSpPr>
-          <p:nvPr>
-            <p:ph type="title"/>
-          </p:nvPr>
-        </p:nvSpPr>
-        <p:spPr>
-          <a:xfrm>
-            <a:off x="384725" y="467785"/>
-            <a:ext cx="8301990" cy="443711"/>
-          </a:xfrm>
-          <a:prstGeom prst="rect">
-            <a:avLst/>
-          </a:prstGeom>
-        </p:spPr>
-        <p:txBody>
-          <a:bodyPr vert="horz" wrap="square" lIns="0" tIns="12700" rIns="0" bIns="0" rtlCol="0">
-            <a:spAutoFit/>
-          </a:bodyPr>
-          <a:lstStyle/>
-          <a:p>
-            <a:pPr marL="12700">
-              <a:lnSpc>
-                <a:spcPct val="100000"/>
-              </a:lnSpc>
-              <a:spcBef>
-                <a:spcPts val="100"/>
-              </a:spcBef>
-            </a:pPr>
-            <a:r>
-              <a:rPr lang="en-US" sz="2800" spc="-20" dirty="0"/>
-              <a:t>Conclusions</a:t>
-            </a:r>
-            <a:endParaRPr sz="2800" spc="110" dirty="0"/>
-          </a:p>
-        </p:txBody>
-      </p:sp>
-      <p:grpSp>
-        <p:nvGrpSpPr>
-          <p:cNvPr id="3" name="object 3"/>
-          <p:cNvGrpSpPr/>
-          <p:nvPr/>
-        </p:nvGrpSpPr>
-        <p:grpSpPr>
-          <a:xfrm>
-            <a:off x="693875" y="1212987"/>
-            <a:ext cx="7613650" cy="3426460"/>
-            <a:chOff x="693875" y="1212987"/>
-            <a:chExt cx="7613650" cy="3426460"/>
-          </a:xfrm>
-        </p:grpSpPr>
-        <p:sp>
-          <p:nvSpPr>
-            <p:cNvPr id="4" name="object 4"/>
-            <p:cNvSpPr/>
-            <p:nvPr/>
-          </p:nvSpPr>
-          <p:spPr>
-            <a:xfrm>
-              <a:off x="698566" y="1217750"/>
-              <a:ext cx="7604125" cy="464184"/>
-            </a:xfrm>
-            <a:custGeom>
-              <a:avLst/>
-              <a:gdLst/>
-              <a:ahLst/>
-              <a:cxnLst/>
-              <a:rect l="l" t="t" r="r" b="b"/>
-              <a:pathLst>
-                <a:path w="7604125" h="464185">
-                  <a:moveTo>
-                    <a:pt x="7604093" y="464099"/>
-                  </a:moveTo>
-                  <a:lnTo>
-                    <a:pt x="0" y="464099"/>
-                  </a:lnTo>
-                  <a:lnTo>
-                    <a:pt x="0" y="0"/>
-                  </a:lnTo>
-                  <a:lnTo>
-                    <a:pt x="7604093" y="0"/>
-                  </a:lnTo>
-                  <a:lnTo>
-                    <a:pt x="7604093" y="464099"/>
-                  </a:lnTo>
-                  <a:close/>
-                </a:path>
-              </a:pathLst>
-            </a:custGeom>
-            <a:solidFill>
-              <a:srgbClr val="2A3890"/>
-            </a:solidFill>
-          </p:spPr>
-          <p:txBody>
-            <a:bodyPr wrap="square" lIns="0" tIns="0" rIns="0" bIns="0" rtlCol="0"/>
-            <a:lstStyle/>
-            <a:p>
-              <a:endParaRPr/>
-            </a:p>
-          </p:txBody>
-        </p:sp>
-        <p:sp>
-          <p:nvSpPr>
-            <p:cNvPr id="5" name="object 5"/>
-            <p:cNvSpPr/>
-            <p:nvPr/>
-          </p:nvSpPr>
-          <p:spPr>
-            <a:xfrm>
-              <a:off x="698638" y="1217750"/>
-              <a:ext cx="7604125" cy="3416935"/>
-            </a:xfrm>
-            <a:custGeom>
-              <a:avLst/>
-              <a:gdLst/>
-              <a:ahLst/>
-              <a:cxnLst/>
-              <a:rect l="l" t="t" r="r" b="b"/>
-              <a:pathLst>
-                <a:path w="7604125" h="3416935">
-                  <a:moveTo>
-                    <a:pt x="0" y="0"/>
-                  </a:moveTo>
-                  <a:lnTo>
-                    <a:pt x="7604092" y="0"/>
-                  </a:lnTo>
-                  <a:lnTo>
-                    <a:pt x="7604092" y="3416399"/>
-                  </a:lnTo>
-                  <a:lnTo>
-                    <a:pt x="0" y="3416399"/>
-                  </a:lnTo>
-                  <a:lnTo>
-                    <a:pt x="0" y="0"/>
-                  </a:lnTo>
-                  <a:close/>
-                </a:path>
-              </a:pathLst>
-            </a:custGeom>
-            <a:ln w="9524">
-              <a:solidFill>
-                <a:srgbClr val="2A3890"/>
-              </a:solidFill>
-            </a:ln>
-          </p:spPr>
-          <p:txBody>
-            <a:bodyPr wrap="square" lIns="0" tIns="0" rIns="0" bIns="0" rtlCol="0"/>
-            <a:lstStyle/>
-            <a:p>
-              <a:endParaRPr/>
-            </a:p>
-          </p:txBody>
-        </p:sp>
-      </p:grpSp>
-      <p:sp>
-        <p:nvSpPr>
-          <p:cNvPr id="6" name="object 6"/>
-          <p:cNvSpPr txBox="1"/>
-          <p:nvPr/>
-        </p:nvSpPr>
-        <p:spPr>
-          <a:xfrm>
-            <a:off x="1143000" y="1893189"/>
-            <a:ext cx="6549390" cy="2598147"/>
-          </a:xfrm>
-          <a:prstGeom prst="rect">
-            <a:avLst/>
-          </a:prstGeom>
-        </p:spPr>
-        <p:txBody>
-          <a:bodyPr vert="horz" wrap="square" lIns="0" tIns="12700" rIns="0" bIns="0" rtlCol="0">
-            <a:spAutoFit/>
-          </a:bodyPr>
-          <a:lstStyle/>
-          <a:p>
-            <a:pPr marL="457200" lvl="0" indent="-342900" algn="l" rtl="0">
-              <a:spcBef>
-                <a:spcPts val="0"/>
-              </a:spcBef>
-              <a:spcAft>
-                <a:spcPts val="0"/>
-              </a:spcAft>
-              <a:buClr>
-                <a:schemeClr val="dk1"/>
-              </a:buClr>
-              <a:buSzPts val="1800"/>
-              <a:buFont typeface="Open Sans"/>
-              <a:buChar char="●"/>
-            </a:pPr>
-            <a:r>
-              <a:rPr lang="en-US" sz="1400" dirty="0"/>
-              <a:t>In this project, I used historical data from the </a:t>
-            </a:r>
-            <a:r>
-              <a:rPr lang="en-US" sz="1400" dirty="0">
-                <a:hlinkClick r:id="rId2"/>
-              </a:rPr>
-              <a:t>Berkeley Earth Dataset</a:t>
-            </a:r>
-            <a:r>
-              <a:rPr lang="en-US" sz="1400" dirty="0"/>
-              <a:t> to predict the Average Land and Surface Temperature using other temperature features.</a:t>
-            </a:r>
-          </a:p>
-          <a:p>
-            <a:pPr marL="457200" lvl="0" indent="-342900" algn="l" rtl="0">
-              <a:spcBef>
-                <a:spcPts val="0"/>
-              </a:spcBef>
-              <a:spcAft>
-                <a:spcPts val="0"/>
-              </a:spcAft>
-              <a:buClr>
-                <a:schemeClr val="dk1"/>
-              </a:buClr>
-              <a:buSzPts val="1800"/>
-              <a:buFont typeface="Open Sans"/>
-              <a:buChar char="●"/>
-            </a:pPr>
-            <a:r>
-              <a:rPr lang="en-US" sz="1400" dirty="0"/>
-              <a:t>As my target variable is continuous and I know the target and feature variables, I created a supervised regression machine learning model. I tested several supervised ML algorithms and found that the KNN regressor had the best performance metrics.</a:t>
-            </a:r>
-          </a:p>
-          <a:p>
-            <a:pPr marL="457200" lvl="0" indent="-342900" algn="l" rtl="0">
-              <a:spcBef>
-                <a:spcPts val="0"/>
-              </a:spcBef>
-              <a:spcAft>
-                <a:spcPts val="0"/>
-              </a:spcAft>
-              <a:buClr>
-                <a:schemeClr val="dk1"/>
-              </a:buClr>
-              <a:buSzPts val="1800"/>
-              <a:buFont typeface="Open Sans"/>
-              <a:buChar char="●"/>
-            </a:pPr>
-            <a:r>
-              <a:rPr lang="en-US" sz="1400" dirty="0">
-                <a:solidFill>
-                  <a:schemeClr val="dk1"/>
-                </a:solidFill>
-                <a:latin typeface="Open Sans"/>
-                <a:ea typeface="Open Sans"/>
-                <a:cs typeface="Open Sans"/>
-                <a:sym typeface="Open Sans"/>
-              </a:rPr>
-              <a:t>My model beat the established baseline of 2.03 degrees and accurately predicted the average temperature.</a:t>
-            </a:r>
-          </a:p>
-          <a:p>
-            <a:pPr marL="457200" lvl="0" indent="-342900" algn="l" rtl="0">
-              <a:spcBef>
-                <a:spcPts val="0"/>
-              </a:spcBef>
-              <a:spcAft>
-                <a:spcPts val="0"/>
-              </a:spcAft>
-              <a:buClr>
-                <a:schemeClr val="dk1"/>
-              </a:buClr>
-              <a:buSzPts val="1800"/>
-              <a:buFont typeface="Open Sans"/>
-              <a:buChar char="●"/>
-            </a:pPr>
-            <a:endParaRPr lang="en-US" sz="1400" b="0" dirty="0">
-              <a:solidFill>
-                <a:schemeClr val="dk1"/>
-              </a:solidFill>
-              <a:latin typeface="Open Sans"/>
-              <a:ea typeface="Open Sans"/>
-              <a:cs typeface="Open Sans"/>
-              <a:sym typeface="Open Sans"/>
-            </a:endParaRPr>
-          </a:p>
-          <a:p>
-            <a:pPr marL="457200" lvl="0" indent="-342900" algn="l" rtl="0">
-              <a:spcBef>
-                <a:spcPts val="0"/>
-              </a:spcBef>
-              <a:spcAft>
-                <a:spcPts val="0"/>
-              </a:spcAft>
-              <a:buClr>
-                <a:schemeClr val="dk1"/>
-              </a:buClr>
-              <a:buSzPts val="1800"/>
-              <a:buFont typeface="Open Sans"/>
-              <a:buChar char="●"/>
-            </a:pPr>
-            <a:endParaRPr lang="en-US" sz="1400" b="0" dirty="0">
-              <a:solidFill>
-                <a:schemeClr val="dk1"/>
-              </a:solidFill>
-              <a:latin typeface="Open Sans"/>
-              <a:ea typeface="Open Sans"/>
-              <a:cs typeface="Open Sans"/>
-              <a:sym typeface="Open Sans"/>
-            </a:endParaRPr>
-          </a:p>
-          <a:p>
-            <a:pPr marL="457200" lvl="0" indent="-342900" algn="l" rtl="0">
-              <a:spcBef>
-                <a:spcPts val="0"/>
-              </a:spcBef>
-              <a:spcAft>
-                <a:spcPts val="0"/>
-              </a:spcAft>
-              <a:buClr>
-                <a:schemeClr val="dk1"/>
-              </a:buClr>
-              <a:buSzPts val="1800"/>
-              <a:buFont typeface="Open Sans"/>
-              <a:buChar char="●"/>
-            </a:pPr>
-            <a:endParaRPr lang="en-US" sz="1400" b="0" dirty="0">
-              <a:solidFill>
-                <a:schemeClr val="dk1"/>
-              </a:solidFill>
-              <a:latin typeface="Open Sans"/>
-              <a:ea typeface="Open Sans"/>
-              <a:cs typeface="Open Sans"/>
-              <a:sym typeface="Open Sans"/>
-            </a:endParaRPr>
-          </a:p>
-        </p:txBody>
-      </p:sp>
-    </p:spTree>
-    <p:extLst>
-      <p:ext uri="{BB962C8B-B14F-4D97-AF65-F5344CB8AC3E}">
-        <p14:creationId xmlns:p14="http://schemas.microsoft.com/office/powerpoint/2010/main" val="3067067221"/>
-      </p:ext>
-    </p:extLst>
   </p:cSld>
   <p:clrMapOvr>
     <a:masterClrMapping/>
@@ -8351,8 +7765,8 @@
               </a:spcBef>
             </a:pPr>
             <a:r>
-              <a:rPr lang="en-US" sz="2800" dirty="0"/>
-              <a:t>Real World Applications</a:t>
+              <a:rPr lang="en-US" sz="2800" spc="-20" dirty="0"/>
+              <a:t>Conclusions</a:t>
             </a:r>
             <a:endParaRPr sz="2800" spc="110" dirty="0"/>
           </a:p>
@@ -8483,8 +7897,8 @@
         </p:nvSpPr>
         <p:spPr>
           <a:xfrm>
-            <a:off x="1066800" y="1885950"/>
-            <a:ext cx="6549390" cy="2936701"/>
+            <a:off x="1143000" y="1893189"/>
+            <a:ext cx="6549390" cy="2813591"/>
           </a:xfrm>
           <a:prstGeom prst="rect">
             <a:avLst/>
@@ -8511,16 +7925,12 @@
               <a:buChar char="●"/>
             </a:pPr>
             <a:r>
-              <a:rPr lang="en-US" sz="1600" dirty="0">
-                <a:solidFill>
-                  <a:schemeClr val="dk1"/>
-                </a:solidFill>
-                <a:latin typeface="Open Sans"/>
-                <a:ea typeface="Open Sans"/>
-                <a:cs typeface="Open Sans"/>
-                <a:sym typeface="Open Sans"/>
-              </a:rPr>
-              <a:t>My supervised machine learning problem is helpful for predicting average, minimum, or maximum temperature from historical data.</a:t>
+              <a:rPr lang="en-US" sz="1400" dirty="0">
+                <a:latin typeface="Open Sans" panose="020B0606030504020204" pitchFamily="34" charset="0"/>
+                <a:ea typeface="Open Sans" panose="020B0606030504020204" pitchFamily="34" charset="0"/>
+                <a:cs typeface="Open Sans" panose="020B0606030504020204" pitchFamily="34" charset="0"/>
+              </a:rPr>
+              <a:t>In this project, I used consumer data from 2,000 individuals to categorize customers based on income, age, and spending score. I also had access to categorical data such as gender, marital status, and city size.</a:t>
             </a:r>
           </a:p>
           <a:p>
@@ -8539,16 +7949,12 @@
               <a:buChar char="●"/>
             </a:pPr>
             <a:r>
-              <a:rPr lang="en-US" sz="1600" dirty="0">
-                <a:solidFill>
-                  <a:schemeClr val="dk1"/>
-                </a:solidFill>
-                <a:latin typeface="Open Sans"/>
-                <a:ea typeface="Open Sans"/>
-                <a:cs typeface="Open Sans"/>
-                <a:sym typeface="Open Sans"/>
-              </a:rPr>
-              <a:t>In the real world, I would like to use an existing dataset to predict future temperatures.</a:t>
+              <a:rPr lang="en-US" sz="1400" dirty="0">
+                <a:latin typeface="Open Sans" panose="020B0606030504020204" pitchFamily="34" charset="0"/>
+                <a:ea typeface="Open Sans" panose="020B0606030504020204" pitchFamily="34" charset="0"/>
+                <a:cs typeface="Open Sans" panose="020B0606030504020204" pitchFamily="34" charset="0"/>
+              </a:rPr>
+              <a:t>Skilled and highly educated individuals earn more than those who are less skilled. A person living in a big city generally has a higher annual income than one in a small city. </a:t>
             </a:r>
           </a:p>
           <a:p>
@@ -8567,16 +7973,12 @@
               <a:buChar char="●"/>
             </a:pPr>
             <a:r>
-              <a:rPr lang="en-US" sz="1600" dirty="0">
-                <a:solidFill>
-                  <a:schemeClr val="dk1"/>
-                </a:solidFill>
-                <a:latin typeface="Open Sans"/>
-                <a:ea typeface="Open Sans"/>
-                <a:cs typeface="Open Sans"/>
-                <a:sym typeface="Open Sans"/>
-              </a:rPr>
-              <a:t>This requires forecasting time series data in the future. A well- known machine learning method would be implementing a Convolution Neural Network (CNN).</a:t>
+              <a:rPr lang="en-US" sz="1400" dirty="0">
+                <a:latin typeface="Open Sans" panose="020B0606030504020204" pitchFamily="34" charset="0"/>
+                <a:ea typeface="Open Sans" panose="020B0606030504020204" pitchFamily="34" charset="0"/>
+                <a:cs typeface="Open Sans" panose="020B0606030504020204" pitchFamily="34" charset="0"/>
+              </a:rPr>
+              <a:t>Through data visualization, I found that males made more money than females and singles made more money than those that were not single.</a:t>
             </a:r>
           </a:p>
           <a:p>
@@ -8595,65 +7997,20 @@
               <a:buChar char="●"/>
             </a:pPr>
             <a:r>
-              <a:rPr lang="en-US" sz="1600" b="0" dirty="0">
-                <a:solidFill>
-                  <a:schemeClr val="dk1"/>
-                </a:solidFill>
-                <a:latin typeface="Open Sans"/>
-                <a:ea typeface="Open Sans"/>
-                <a:cs typeface="Open Sans"/>
-                <a:sym typeface="Open Sans"/>
-              </a:rPr>
-              <a:t>A good overview of the problem is described in </a:t>
-            </a:r>
-            <a:r>
-              <a:rPr lang="en-US" sz="1600" b="0" dirty="0">
-                <a:solidFill>
-                  <a:schemeClr val="dk1"/>
-                </a:solidFill>
-                <a:latin typeface="Open Sans"/>
-                <a:ea typeface="Open Sans"/>
-                <a:cs typeface="Open Sans"/>
-                <a:sym typeface="Open Sans"/>
-                <a:hlinkClick r:id="rId2"/>
-              </a:rPr>
-              <a:t>this Medium post</a:t>
-            </a:r>
-            <a:r>
-              <a:rPr lang="en-US" sz="1600" b="0" dirty="0">
-                <a:solidFill>
-                  <a:schemeClr val="dk1"/>
-                </a:solidFill>
-                <a:latin typeface="Open Sans"/>
-                <a:ea typeface="Open Sans"/>
-                <a:cs typeface="Open Sans"/>
-                <a:sym typeface="Open Sans"/>
-              </a:rPr>
-              <a:t>.</a:t>
-            </a:r>
-          </a:p>
-          <a:p>
-            <a:pPr marL="457200" lvl="0" indent="-342900" algn="l" rtl="0">
-              <a:spcBef>
-                <a:spcPts val="0"/>
-              </a:spcBef>
-              <a:spcAft>
-                <a:spcPts val="0"/>
-              </a:spcAft>
-              <a:buClr>
-                <a:schemeClr val="dk1"/>
-              </a:buClr>
-              <a:buSzPts val="1800"/>
-              <a:buFont typeface="Open Sans"/>
-              <a:buChar char="●"/>
-            </a:pPr>
-            <a:endParaRPr lang="en-US" sz="1600" b="0" dirty="0">
+              <a:rPr lang="en-US" sz="1400" dirty="0">
+                <a:latin typeface="Open Sans" panose="020B0606030504020204" pitchFamily="34" charset="0"/>
+                <a:ea typeface="Open Sans" panose="020B0606030504020204" pitchFamily="34" charset="0"/>
+                <a:cs typeface="Open Sans" panose="020B0606030504020204" pitchFamily="34" charset="0"/>
+              </a:rPr>
+              <a:t>Those who were older and earn more had higher spending scores, according to cluster analysis. Therefore, wealthy customers (including highly educated customers) are more likely to spend money at a shopping mall.</a:t>
+            </a:r>
+            <a:endParaRPr lang="en-US" sz="1400" b="0" dirty="0">
               <a:solidFill>
                 <a:schemeClr val="dk1"/>
               </a:solidFill>
-              <a:latin typeface="Open Sans"/>
-              <a:ea typeface="Open Sans"/>
-              <a:cs typeface="Open Sans"/>
+              <a:latin typeface="Open Sans" panose="020B0606030504020204" pitchFamily="34" charset="0"/>
+              <a:ea typeface="Open Sans" panose="020B0606030504020204" pitchFamily="34" charset="0"/>
+              <a:cs typeface="Open Sans" panose="020B0606030504020204" pitchFamily="34" charset="0"/>
               <a:sym typeface="Open Sans"/>
             </a:endParaRPr>
           </a:p>
@@ -8687,7 +8044,7 @@
     </p:spTree>
     <p:extLst>
       <p:ext uri="{BB962C8B-B14F-4D97-AF65-F5344CB8AC3E}">
-        <p14:creationId xmlns:p14="http://schemas.microsoft.com/office/powerpoint/2010/main" val="2089662409"/>
+        <p14:creationId xmlns:p14="http://schemas.microsoft.com/office/powerpoint/2010/main" val="3067067221"/>
       </p:ext>
     </p:extLst>
   </p:cSld>
@@ -8749,7 +8106,7 @@
             </a:pPr>
             <a:r>
               <a:rPr lang="en-US" sz="2800" dirty="0"/>
-              <a:t>Additional Features for Temperature Forecasting</a:t>
+              <a:t>Real World Applications</a:t>
             </a:r>
             <a:endParaRPr sz="2800" spc="110" dirty="0"/>
           </a:p>
@@ -8880,8 +8237,8 @@
         </p:nvSpPr>
         <p:spPr>
           <a:xfrm>
-            <a:off x="990600" y="1808550"/>
-            <a:ext cx="6549390" cy="3306033"/>
+            <a:off x="1066800" y="1885950"/>
+            <a:ext cx="6549390" cy="2444259"/>
           </a:xfrm>
           <a:prstGeom prst="rect">
             <a:avLst/>
@@ -8917,7 +8274,35 @@
                 <a:cs typeface="Open Sans"/>
                 <a:sym typeface="Open Sans"/>
               </a:rPr>
-              <a:t>The National Oceanic and Atmospheric Administration tracks </a:t>
+              <a:t>The findings of this investigation could be shared with the mall's marketing team. The cluster analysis would also be valuable for store managers looking to open new locations.</a:t>
+            </a:r>
+          </a:p>
+          <a:p>
+            <a:pPr marL="457200" lvl="0" indent="-342900" algn="l" rtl="0">
+              <a:spcBef>
+                <a:spcPts val="0"/>
+              </a:spcBef>
+              <a:spcAft>
+                <a:spcPts val="0"/>
+              </a:spcAft>
+              <a:buClr>
+                <a:schemeClr val="dk1"/>
+              </a:buClr>
+              <a:buSzPts val="1800"/>
+              <a:buFont typeface="Open Sans"/>
+              <a:buChar char="●"/>
+            </a:pPr>
+            <a:r>
+              <a:rPr lang="en-US" sz="1600" dirty="0">
+                <a:solidFill>
+                  <a:schemeClr val="dk1"/>
+                </a:solidFill>
+                <a:latin typeface="Open Sans"/>
+                <a:ea typeface="Open Sans"/>
+                <a:cs typeface="Open Sans"/>
+                <a:sym typeface="Open Sans"/>
+              </a:rPr>
+              <a:t>Other clustering techniques could be used to group customers. A </a:t>
             </a:r>
             <a:r>
               <a:rPr lang="en-US" sz="1600" dirty="0">
@@ -8930,7 +8315,7 @@
                 <a:sym typeface="Open Sans"/>
                 <a:hlinkClick r:id="rId2"/>
               </a:rPr>
-              <a:t>factors impacting temperature and climate</a:t>
+              <a:t>2022 study</a:t>
             </a:r>
             <a:r>
               <a:rPr lang="en-US" sz="1600" dirty="0">
@@ -8942,107 +8327,7 @@
                 <a:cs typeface="Open Sans"/>
                 <a:sym typeface="Open Sans"/>
               </a:rPr>
-              <a:t>. Further analysis can be performed after adding:</a:t>
-            </a:r>
-          </a:p>
-          <a:p>
-            <a:pPr marL="805815" marR="5080" lvl="1" indent="-336550">
-              <a:lnSpc>
-                <a:spcPct val="169600"/>
-              </a:lnSpc>
-              <a:buFont typeface="Arial"/>
-              <a:buChar char="○"/>
-              <a:tabLst>
-                <a:tab pos="805815" algn="l"/>
-              </a:tabLst>
-            </a:pPr>
-            <a:r>
-              <a:rPr lang="en-US" sz="1600" dirty="0">
-                <a:latin typeface="Open Sans" panose="020B0606030504020204" pitchFamily="34" charset="0"/>
-                <a:ea typeface="Open Sans" panose="020B0606030504020204" pitchFamily="34" charset="0"/>
-                <a:cs typeface="Open Sans" panose="020B0606030504020204" pitchFamily="34" charset="0"/>
-              </a:rPr>
-              <a:t>Latitude and Elevation</a:t>
-            </a:r>
-          </a:p>
-          <a:p>
-            <a:pPr marL="805815" marR="5080" lvl="1" indent="-336550">
-              <a:lnSpc>
-                <a:spcPct val="169600"/>
-              </a:lnSpc>
-              <a:buFont typeface="Arial"/>
-              <a:buChar char="○"/>
-              <a:tabLst>
-                <a:tab pos="805815" algn="l"/>
-              </a:tabLst>
-            </a:pPr>
-            <a:r>
-              <a:rPr lang="en-US" sz="1600" dirty="0">
-                <a:latin typeface="Open Sans" panose="020B0606030504020204" pitchFamily="34" charset="0"/>
-                <a:ea typeface="Open Sans" panose="020B0606030504020204" pitchFamily="34" charset="0"/>
-                <a:cs typeface="Open Sans" panose="020B0606030504020204" pitchFamily="34" charset="0"/>
-              </a:rPr>
-              <a:t>Nearness to center of large landmasses or bodies of water</a:t>
-            </a:r>
-          </a:p>
-          <a:p>
-            <a:pPr marL="805815" marR="5080" lvl="1" indent="-336550">
-              <a:lnSpc>
-                <a:spcPct val="169600"/>
-              </a:lnSpc>
-              <a:buFont typeface="Arial"/>
-              <a:buChar char="○"/>
-              <a:tabLst>
-                <a:tab pos="805815" algn="l"/>
-              </a:tabLst>
-            </a:pPr>
-            <a:r>
-              <a:rPr lang="en-US" sz="1600" dirty="0">
-                <a:latin typeface="Open Sans" panose="020B0606030504020204" pitchFamily="34" charset="0"/>
-                <a:ea typeface="Open Sans" panose="020B0606030504020204" pitchFamily="34" charset="0"/>
-                <a:cs typeface="Open Sans" panose="020B0606030504020204" pitchFamily="34" charset="0"/>
-              </a:rPr>
-              <a:t>Location relative to large mountain ranges</a:t>
-            </a:r>
-          </a:p>
-          <a:p>
-            <a:pPr marL="805815" marR="5080" lvl="1" indent="-336550">
-              <a:lnSpc>
-                <a:spcPct val="169600"/>
-              </a:lnSpc>
-              <a:buFont typeface="Arial"/>
-              <a:buChar char="○"/>
-              <a:tabLst>
-                <a:tab pos="805815" algn="l"/>
-              </a:tabLst>
-            </a:pPr>
-            <a:r>
-              <a:rPr lang="en-US" sz="1600" dirty="0">
-                <a:latin typeface="Open Sans" panose="020B0606030504020204" pitchFamily="34" charset="0"/>
-                <a:ea typeface="Open Sans" panose="020B0606030504020204" pitchFamily="34" charset="0"/>
-                <a:cs typeface="Open Sans" panose="020B0606030504020204" pitchFamily="34" charset="0"/>
-              </a:rPr>
-              <a:t>Humidity</a:t>
-            </a:r>
-          </a:p>
-          <a:p>
-            <a:pPr marL="805815" marR="5080" lvl="1" indent="-336550">
-              <a:lnSpc>
-                <a:spcPct val="169600"/>
-              </a:lnSpc>
-              <a:buFont typeface="Arial"/>
-              <a:buChar char="○"/>
-              <a:tabLst>
-                <a:tab pos="805815" algn="l"/>
-              </a:tabLst>
-            </a:pPr>
-            <a:r>
-              <a:rPr lang="en-US" sz="1600" dirty="0">
-                <a:latin typeface="Open Sans" panose="020B0606030504020204" pitchFamily="34" charset="0"/>
-                <a:ea typeface="Open Sans" panose="020B0606030504020204" pitchFamily="34" charset="0"/>
-                <a:cs typeface="Open Sans" panose="020B0606030504020204" pitchFamily="34" charset="0"/>
-              </a:rPr>
-              <a:t>Ocean Currents</a:t>
+              <a:t> used Mini Batch K-means and Mean Shift.</a:t>
             </a:r>
           </a:p>
           <a:p>
@@ -9060,6 +8345,108 @@
               <a:buFont typeface="Open Sans"/>
               <a:buChar char="●"/>
             </a:pPr>
+            <a:r>
+              <a:rPr lang="en-US" sz="1600" dirty="0">
+                <a:solidFill>
+                  <a:schemeClr val="dk1"/>
+                </a:solidFill>
+                <a:latin typeface="Open Sans"/>
+                <a:ea typeface="Open Sans"/>
+                <a:cs typeface="Open Sans"/>
+                <a:sym typeface="Open Sans"/>
+              </a:rPr>
+              <a:t>Customer clustering techniques can be used to identify new customers as described in </a:t>
+            </a:r>
+            <a:r>
+              <a:rPr lang="en-US" sz="1600" dirty="0">
+                <a:solidFill>
+                  <a:schemeClr val="dk1"/>
+                </a:solidFill>
+                <a:latin typeface="Open Sans"/>
+                <a:ea typeface="Open Sans"/>
+                <a:cs typeface="Open Sans"/>
+                <a:sym typeface="Open Sans"/>
+                <a:hlinkClick r:id="rId3"/>
+              </a:rPr>
+              <a:t>this 2017 thesis</a:t>
+            </a:r>
+            <a:r>
+              <a:rPr lang="en-US" sz="1600" dirty="0">
+                <a:solidFill>
+                  <a:schemeClr val="dk1"/>
+                </a:solidFill>
+                <a:latin typeface="Open Sans"/>
+                <a:ea typeface="Open Sans"/>
+                <a:cs typeface="Open Sans"/>
+                <a:sym typeface="Open Sans"/>
+              </a:rPr>
+              <a:t>. </a:t>
+            </a:r>
+          </a:p>
+          <a:p>
+            <a:pPr marL="457200" lvl="0" indent="-342900" algn="l" rtl="0">
+              <a:spcBef>
+                <a:spcPts val="0"/>
+              </a:spcBef>
+              <a:spcAft>
+                <a:spcPts val="0"/>
+              </a:spcAft>
+              <a:buClr>
+                <a:schemeClr val="dk1"/>
+              </a:buClr>
+              <a:buSzPts val="1800"/>
+              <a:buFont typeface="Open Sans"/>
+              <a:buChar char="●"/>
+            </a:pPr>
+            <a:r>
+              <a:rPr lang="en-US" sz="1600" b="0" dirty="0">
+                <a:solidFill>
+                  <a:schemeClr val="dk1"/>
+                </a:solidFill>
+                <a:latin typeface="Open Sans"/>
+                <a:ea typeface="Open Sans"/>
+                <a:cs typeface="Open Sans"/>
+                <a:sym typeface="Open Sans"/>
+              </a:rPr>
+              <a:t>A comprehensive </a:t>
+            </a:r>
+            <a:r>
+              <a:rPr lang="en-US" sz="1600" dirty="0">
+                <a:solidFill>
+                  <a:schemeClr val="dk1"/>
+                </a:solidFill>
+                <a:latin typeface="Open Sans"/>
+                <a:ea typeface="Open Sans"/>
+                <a:cs typeface="Open Sans"/>
+                <a:sym typeface="Open Sans"/>
+              </a:rPr>
+              <a:t>analysis of clustering algorithms and real-world applications is described in </a:t>
+            </a:r>
+            <a:r>
+              <a:rPr lang="en-US" sz="1600" dirty="0">
+                <a:solidFill>
+                  <a:schemeClr val="dk1"/>
+                </a:solidFill>
+                <a:latin typeface="Open Sans"/>
+                <a:ea typeface="Open Sans"/>
+                <a:cs typeface="Open Sans"/>
+                <a:sym typeface="Open Sans"/>
+                <a:hlinkClick r:id="rId4"/>
+              </a:rPr>
+              <a:t>this Neptune AI blog post</a:t>
+            </a:r>
+            <a:r>
+              <a:rPr lang="en-US" sz="1600" dirty="0">
+                <a:solidFill>
+                  <a:schemeClr val="dk1"/>
+                </a:solidFill>
+                <a:latin typeface="Open Sans"/>
+                <a:ea typeface="Open Sans"/>
+                <a:cs typeface="Open Sans"/>
+                <a:sym typeface="Open Sans"/>
+              </a:rPr>
+              <a:t>.</a:t>
+            </a:r>
             <a:endParaRPr lang="en-US" sz="1600" b="0" dirty="0">
               <a:solidFill>
                 <a:schemeClr val="dk1"/>
@@ -9100,7 +8487,7 @@
     </p:spTree>
     <p:extLst>
       <p:ext uri="{BB962C8B-B14F-4D97-AF65-F5344CB8AC3E}">
-        <p14:creationId xmlns:p14="http://schemas.microsoft.com/office/powerpoint/2010/main" val="773446582"/>
+        <p14:creationId xmlns:p14="http://schemas.microsoft.com/office/powerpoint/2010/main" val="2089662409"/>
       </p:ext>
     </p:extLst>
   </p:cSld>
@@ -9382,7 +8769,7 @@
                 <a:cs typeface="Open Sans"/>
                 <a:sym typeface="Open Sans"/>
               </a:rPr>
-              <a:t>There are five categorical variables for city size, gender, marital status, level of education, and occupation.</a:t>
+              <a:t>Data has five categorical variables for city size, gender, marital status, level of education, and occupation.</a:t>
             </a:r>
           </a:p>
           <a:p>
@@ -9555,7 +8942,7 @@
             </a:pPr>
             <a:r>
               <a:rPr lang="en-US" sz="2800" dirty="0"/>
-              <a:t>Recommendations for further research</a:t>
+              <a:t>Additional Features for Classifying Customers</a:t>
             </a:r>
             <a:endParaRPr sz="2800" spc="110" dirty="0"/>
           </a:p>
@@ -9686,8 +9073,8 @@
         </p:nvSpPr>
         <p:spPr>
           <a:xfrm>
-            <a:off x="1066800" y="1885950"/>
-            <a:ext cx="6549390" cy="2813591"/>
+            <a:off x="990600" y="1808550"/>
+            <a:ext cx="6549390" cy="4069319"/>
           </a:xfrm>
           <a:prstGeom prst="rect">
             <a:avLst/>
@@ -9714,19 +9101,221 @@
               <a:buChar char="●"/>
             </a:pPr>
             <a:r>
-              <a:rPr lang="en-US" sz="1400" dirty="0"/>
-              <a:t>The </a:t>
-            </a:r>
-            <a:r>
-              <a:rPr lang="en-US" sz="1400" dirty="0">
+              <a:rPr lang="en-US" sz="1600" dirty="0">
+                <a:solidFill>
+                  <a:schemeClr val="dk1"/>
+                </a:solidFill>
+                <a:latin typeface="Open Sans"/>
+                <a:ea typeface="Open Sans"/>
+                <a:cs typeface="Open Sans"/>
+                <a:sym typeface="Open Sans"/>
+              </a:rPr>
+              <a:t>A </a:t>
+            </a:r>
+            <a:r>
+              <a:rPr lang="en-US" sz="1600" dirty="0">
+                <a:solidFill>
+                  <a:schemeClr val="dk1"/>
+                </a:solidFill>
+                <a:latin typeface="Open Sans"/>
+                <a:ea typeface="Open Sans"/>
+                <a:cs typeface="Open Sans"/>
+                <a:sym typeface="Open Sans"/>
                 <a:hlinkClick r:id="rId2"/>
               </a:rPr>
-              <a:t>Berkeley Earth Climate Change study</a:t>
-            </a:r>
-            <a:r>
-              <a:rPr lang="en-US" sz="1400" dirty="0"/>
-              <a:t> includes separate data for Global Average Land Temperature by Country, Global Average Land Temperature by State, and Global Land Temperatures By City. A separate analysis could be performed on any of these datasets.</a:t>
-            </a:r>
+              <a:t>2021 study</a:t>
+            </a:r>
+            <a:r>
+              <a:rPr lang="en-US" sz="1600" dirty="0">
+                <a:solidFill>
+                  <a:schemeClr val="dk1"/>
+                </a:solidFill>
+                <a:latin typeface="Open Sans"/>
+                <a:ea typeface="Open Sans"/>
+                <a:cs typeface="Open Sans"/>
+                <a:sym typeface="Open Sans"/>
+              </a:rPr>
+              <a:t> analyzed factors influencing customer segregation at shopping malls. Further analysis can be performed by adding:</a:t>
+            </a:r>
+          </a:p>
+          <a:p>
+            <a:pPr marL="805815" marR="5080" lvl="1" indent="-336550">
+              <a:lnSpc>
+                <a:spcPct val="169600"/>
+              </a:lnSpc>
+              <a:buFont typeface="Arial"/>
+              <a:buChar char="○"/>
+              <a:tabLst>
+                <a:tab pos="805815" algn="l"/>
+              </a:tabLst>
+            </a:pPr>
+            <a:r>
+              <a:rPr lang="en-US" sz="1600" dirty="0">
+                <a:latin typeface="Open Sans" panose="020B0606030504020204" pitchFamily="34" charset="0"/>
+                <a:ea typeface="Open Sans" panose="020B0606030504020204" pitchFamily="34" charset="0"/>
+                <a:cs typeface="Open Sans" panose="020B0606030504020204" pitchFamily="34" charset="0"/>
+              </a:rPr>
+              <a:t>Location of the customers (Rural, Urban)</a:t>
+            </a:r>
+          </a:p>
+          <a:p>
+            <a:pPr marL="805815" marR="5080" lvl="1" indent="-336550">
+              <a:lnSpc>
+                <a:spcPct val="169600"/>
+              </a:lnSpc>
+              <a:buFont typeface="Arial"/>
+              <a:buChar char="○"/>
+              <a:tabLst>
+                <a:tab pos="805815" algn="l"/>
+              </a:tabLst>
+            </a:pPr>
+            <a:r>
+              <a:rPr lang="en-US" sz="1600" b="0" dirty="0">
+                <a:solidFill>
+                  <a:schemeClr val="dk1"/>
+                </a:solidFill>
+                <a:latin typeface="Open Sans" panose="020B0606030504020204" pitchFamily="34" charset="0"/>
+                <a:ea typeface="Open Sans" panose="020B0606030504020204" pitchFamily="34" charset="0"/>
+                <a:cs typeface="Open Sans" panose="020B0606030504020204" pitchFamily="34" charset="0"/>
+                <a:sym typeface="Open Sans"/>
+              </a:rPr>
+              <a:t>Life stage of the customer (Married, Working, Jobless, Etc.)</a:t>
+            </a:r>
+          </a:p>
+          <a:p>
+            <a:pPr marL="805815" marR="5080" lvl="1" indent="-336550">
+              <a:lnSpc>
+                <a:spcPct val="169600"/>
+              </a:lnSpc>
+              <a:buFont typeface="Arial"/>
+              <a:buChar char="○"/>
+              <a:tabLst>
+                <a:tab pos="805815" algn="l"/>
+              </a:tabLst>
+            </a:pPr>
+            <a:r>
+              <a:rPr lang="en-US" sz="1600" dirty="0">
+                <a:solidFill>
+                  <a:schemeClr val="dk1"/>
+                </a:solidFill>
+                <a:latin typeface="Open Sans" panose="020B0606030504020204" pitchFamily="34" charset="0"/>
+                <a:ea typeface="Open Sans" panose="020B0606030504020204" pitchFamily="34" charset="0"/>
+                <a:cs typeface="Open Sans" panose="020B0606030504020204" pitchFamily="34" charset="0"/>
+                <a:sym typeface="Open Sans"/>
+              </a:rPr>
+              <a:t>How many children the customer has</a:t>
+            </a:r>
+          </a:p>
+          <a:p>
+            <a:pPr marL="805815" marR="5080" lvl="1" indent="-336550">
+              <a:lnSpc>
+                <a:spcPct val="169600"/>
+              </a:lnSpc>
+              <a:buFont typeface="Arial"/>
+              <a:buChar char="○"/>
+              <a:tabLst>
+                <a:tab pos="805815" algn="l"/>
+              </a:tabLst>
+            </a:pPr>
+            <a:r>
+              <a:rPr lang="en-US" sz="1600" dirty="0">
+                <a:solidFill>
+                  <a:schemeClr val="dk1"/>
+                </a:solidFill>
+                <a:latin typeface="Open Sans" panose="020B0606030504020204" pitchFamily="34" charset="0"/>
+                <a:ea typeface="Open Sans" panose="020B0606030504020204" pitchFamily="34" charset="0"/>
+                <a:cs typeface="Open Sans" panose="020B0606030504020204" pitchFamily="34" charset="0"/>
+                <a:sym typeface="Open Sans"/>
+              </a:rPr>
+              <a:t>Monthly disposable income of customers</a:t>
+            </a:r>
+          </a:p>
+          <a:p>
+            <a:pPr marL="805815" marR="5080" lvl="1" indent="-336550">
+              <a:lnSpc>
+                <a:spcPct val="169600"/>
+              </a:lnSpc>
+              <a:buFont typeface="Arial"/>
+              <a:buChar char="○"/>
+              <a:tabLst>
+                <a:tab pos="805815" algn="l"/>
+              </a:tabLst>
+            </a:pPr>
+            <a:r>
+              <a:rPr lang="en-US" sz="1600" dirty="0">
+                <a:solidFill>
+                  <a:schemeClr val="dk1"/>
+                </a:solidFill>
+                <a:latin typeface="Open Sans" panose="020B0606030504020204" pitchFamily="34" charset="0"/>
+                <a:ea typeface="Open Sans" panose="020B0606030504020204" pitchFamily="34" charset="0"/>
+                <a:cs typeface="Open Sans" panose="020B0606030504020204" pitchFamily="34" charset="0"/>
+                <a:sym typeface="Open Sans"/>
+              </a:rPr>
+              <a:t>Ethnic demographic of customers</a:t>
+            </a:r>
+          </a:p>
+          <a:p>
+            <a:pPr marL="805815" marR="5080" lvl="1" indent="-336550">
+              <a:lnSpc>
+                <a:spcPct val="169600"/>
+              </a:lnSpc>
+              <a:buFont typeface="Arial"/>
+              <a:buChar char="○"/>
+              <a:tabLst>
+                <a:tab pos="805815" algn="l"/>
+              </a:tabLst>
+            </a:pPr>
+            <a:endParaRPr lang="en-US" sz="1600" dirty="0">
+              <a:solidFill>
+                <a:schemeClr val="dk1"/>
+              </a:solidFill>
+              <a:latin typeface="Open Sans" panose="020B0606030504020204" pitchFamily="34" charset="0"/>
+              <a:ea typeface="Open Sans" panose="020B0606030504020204" pitchFamily="34" charset="0"/>
+              <a:cs typeface="Open Sans" panose="020B0606030504020204" pitchFamily="34" charset="0"/>
+              <a:sym typeface="Open Sans"/>
+            </a:endParaRPr>
+          </a:p>
+          <a:p>
+            <a:pPr marL="805815" marR="5080" lvl="1" indent="-336550">
+              <a:lnSpc>
+                <a:spcPct val="169600"/>
+              </a:lnSpc>
+              <a:buFont typeface="Arial"/>
+              <a:buChar char="○"/>
+              <a:tabLst>
+                <a:tab pos="805815" algn="l"/>
+              </a:tabLst>
+            </a:pPr>
+            <a:endParaRPr lang="en-US" sz="1600" b="0" dirty="0">
+              <a:solidFill>
+                <a:schemeClr val="dk1"/>
+              </a:solidFill>
+              <a:latin typeface="Open Sans" panose="020B0606030504020204" pitchFamily="34" charset="0"/>
+              <a:ea typeface="Open Sans" panose="020B0606030504020204" pitchFamily="34" charset="0"/>
+              <a:cs typeface="Open Sans" panose="020B0606030504020204" pitchFamily="34" charset="0"/>
+              <a:sym typeface="Open Sans"/>
+            </a:endParaRPr>
+          </a:p>
+          <a:p>
+            <a:pPr marL="805815" marR="5080" lvl="1" indent="-336550">
+              <a:lnSpc>
+                <a:spcPct val="169600"/>
+              </a:lnSpc>
+              <a:buFont typeface="Arial"/>
+              <a:buChar char="○"/>
+              <a:tabLst>
+                <a:tab pos="805815" algn="l"/>
+              </a:tabLst>
+            </a:pPr>
+            <a:endParaRPr lang="en-US" sz="1600" b="0" dirty="0">
+              <a:solidFill>
+                <a:schemeClr val="dk1"/>
+              </a:solidFill>
+              <a:latin typeface="Open Sans"/>
+              <a:ea typeface="Open Sans"/>
+              <a:cs typeface="Open Sans"/>
+              <a:sym typeface="Open Sans"/>
+            </a:endParaRPr>
           </a:p>
           <a:p>
             <a:pPr marL="457200" lvl="0" indent="-342900" algn="l" rtl="0">
@@ -9743,50 +9332,6 @@
               <a:buFont typeface="Open Sans"/>
               <a:buChar char="●"/>
             </a:pPr>
-            <a:r>
-              <a:rPr lang="en-US" sz="1400" dirty="0"/>
-              <a:t>As the temperature data is in the form of time series, one could also use a Recurrent Neural Network (RNN) to predict feature temperatures. This would potentially use a GRU or LSTM. A simplified model on a different dataset is shown </a:t>
-            </a:r>
-            <a:r>
-              <a:rPr lang="en-US" sz="1400" dirty="0">
-                <a:hlinkClick r:id="rId3"/>
-              </a:rPr>
-              <a:t>here</a:t>
-            </a:r>
-            <a:r>
-              <a:rPr lang="en-US" sz="1400" dirty="0"/>
-              <a:t>.</a:t>
-            </a:r>
-          </a:p>
-          <a:p>
-            <a:pPr marL="457200" lvl="0" indent="-342900" algn="l" rtl="0">
-              <a:spcBef>
-                <a:spcPts val="0"/>
-              </a:spcBef>
-              <a:spcAft>
-                <a:spcPts val="0"/>
-              </a:spcAft>
-              <a:buClr>
-                <a:schemeClr val="dk1"/>
-              </a:buClr>
-              <a:buSzPts val="1800"/>
-              <a:buFont typeface="Open Sans"/>
-              <a:buChar char="●"/>
-            </a:pPr>
-            <a:r>
-              <a:rPr lang="en-US" sz="1400" dirty="0"/>
-              <a:t>Instead of predicting the average temperature, one could predict the causes of temperature change. This is an </a:t>
-            </a:r>
-            <a:r>
-              <a:rPr lang="en-US" sz="1400" dirty="0">
-                <a:hlinkClick r:id="rId4"/>
-              </a:rPr>
-              <a:t>active area of research</a:t>
-            </a:r>
-            <a:r>
-              <a:rPr lang="en-US" sz="1400" dirty="0"/>
-              <a:t> in machine learning.</a:t>
-            </a:r>
             <a:endParaRPr lang="en-US" sz="1400" b="0" dirty="0">
               <a:solidFill>
                 <a:schemeClr val="dk1"/>
@@ -9797,62 +9342,12 @@
               <a:sym typeface="Open Sans"/>
             </a:endParaRPr>
           </a:p>
-          <a:p>
-            <a:pPr marL="457200" lvl="0" indent="-342900" algn="l" rtl="0">
-              <a:spcBef>
-                <a:spcPts val="0"/>
-              </a:spcBef>
-              <a:spcAft>
-                <a:spcPts val="0"/>
-              </a:spcAft>
-              <a:buClr>
-                <a:schemeClr val="dk1"/>
-              </a:buClr>
-              <a:buSzPts val="1800"/>
-              <a:buFont typeface="Open Sans"/>
-              <a:buChar char="●"/>
-            </a:pPr>
-            <a:endParaRPr lang="en-US" sz="1400" b="0" dirty="0">
-              <a:solidFill>
-                <a:schemeClr val="dk1"/>
-              </a:solidFill>
-              <a:latin typeface="Open Sans"/>
-              <a:ea typeface="Open Sans"/>
-              <a:cs typeface="Open Sans"/>
-              <a:sym typeface="Open Sans"/>
-            </a:endParaRPr>
-          </a:p>
-          <a:p>
-            <a:pPr marL="457200" lvl="0" indent="-342900" algn="l" rtl="0">
-              <a:spcBef>
-                <a:spcPts val="0"/>
-              </a:spcBef>
-              <a:spcAft>
-                <a:spcPts val="0"/>
-              </a:spcAft>
-              <a:buClr>
-                <a:schemeClr val="dk1"/>
-              </a:buClr>
-              <a:buSzPts val="1800"/>
-              <a:buFont typeface="Open Sans"/>
-              <a:buChar char="●"/>
-            </a:pPr>
-            <a:endParaRPr lang="en-US" sz="1400" b="0" dirty="0">
-              <a:solidFill>
-                <a:schemeClr val="dk1"/>
-              </a:solidFill>
-              <a:latin typeface="Open Sans"/>
-              <a:ea typeface="Open Sans"/>
-              <a:cs typeface="Open Sans"/>
-              <a:sym typeface="Open Sans"/>
-            </a:endParaRPr>
-          </a:p>
         </p:txBody>
       </p:sp>
     </p:spTree>
     <p:extLst>
       <p:ext uri="{BB962C8B-B14F-4D97-AF65-F5344CB8AC3E}">
-        <p14:creationId xmlns:p14="http://schemas.microsoft.com/office/powerpoint/2010/main" val="1666120286"/>
+        <p14:creationId xmlns:p14="http://schemas.microsoft.com/office/powerpoint/2010/main" val="773446582"/>
       </p:ext>
     </p:extLst>
   </p:cSld>
@@ -9914,7 +9409,7 @@
             </a:pPr>
             <a:r>
               <a:rPr lang="en-US" sz="2800" dirty="0"/>
-              <a:t>Notebook Locations</a:t>
+              <a:t>Recommendations for further research</a:t>
             </a:r>
             <a:endParaRPr sz="2800" spc="110" dirty="0"/>
           </a:p>
@@ -10046,7 +9541,7 @@
         <p:spPr>
           <a:xfrm>
             <a:off x="1066800" y="1885950"/>
-            <a:ext cx="6549390" cy="1151597"/>
+            <a:ext cx="6549390" cy="2598147"/>
           </a:xfrm>
           <a:prstGeom prst="rect">
             <a:avLst/>
@@ -10073,45 +9568,12 @@
               <a:buChar char="●"/>
             </a:pPr>
             <a:r>
-              <a:rPr lang="en-US" sz="1600" dirty="0">
+              <a:rPr lang="en-US" sz="1400" dirty="0">
                 <a:latin typeface="Open Sans" panose="020B0606030504020204" pitchFamily="34" charset="0"/>
                 <a:ea typeface="Open Sans" panose="020B0606030504020204" pitchFamily="34" charset="0"/>
                 <a:cs typeface="Open Sans" panose="020B0606030504020204" pitchFamily="34" charset="0"/>
               </a:rPr>
-              <a:t>A </a:t>
-            </a:r>
-            <a:r>
-              <a:rPr lang="en-US" sz="1600" dirty="0" err="1">
-                <a:latin typeface="Open Sans" panose="020B0606030504020204" pitchFamily="34" charset="0"/>
-                <a:ea typeface="Open Sans" panose="020B0606030504020204" pitchFamily="34" charset="0"/>
-                <a:cs typeface="Open Sans" panose="020B0606030504020204" pitchFamily="34" charset="0"/>
-              </a:rPr>
-              <a:t>Jupyter</a:t>
-            </a:r>
-            <a:r>
-              <a:rPr lang="en-US" sz="1600" dirty="0">
-                <a:latin typeface="Open Sans" panose="020B0606030504020204" pitchFamily="34" charset="0"/>
-                <a:ea typeface="Open Sans" panose="020B0606030504020204" pitchFamily="34" charset="0"/>
-                <a:cs typeface="Open Sans" panose="020B0606030504020204" pitchFamily="34" charset="0"/>
-              </a:rPr>
-              <a:t> notebook of my work can be found </a:t>
-            </a:r>
-            <a:r>
-              <a:rPr lang="en-US" sz="1600" dirty="0">
-                <a:latin typeface="Open Sans" panose="020B0606030504020204" pitchFamily="34" charset="0"/>
-                <a:ea typeface="Open Sans" panose="020B0606030504020204" pitchFamily="34" charset="0"/>
-                <a:cs typeface="Open Sans" panose="020B0606030504020204" pitchFamily="34" charset="0"/>
-                <a:hlinkClick r:id="rId2"/>
-              </a:rPr>
-              <a:t>here</a:t>
-            </a:r>
-            <a:r>
-              <a:rPr lang="en-US" sz="1600" dirty="0">
-                <a:latin typeface="Open Sans" panose="020B0606030504020204" pitchFamily="34" charset="0"/>
-                <a:ea typeface="Open Sans" panose="020B0606030504020204" pitchFamily="34" charset="0"/>
-                <a:cs typeface="Open Sans" panose="020B0606030504020204" pitchFamily="34" charset="0"/>
-              </a:rPr>
-              <a:t>.</a:t>
+              <a:t>I could further analyze the five categorical variables: city size, education, gender, marital status, and occupation to see if they have a significant impact on customer groups.</a:t>
             </a:r>
           </a:p>
           <a:p>
@@ -10130,29 +9592,29 @@
               <a:buChar char="●"/>
             </a:pPr>
             <a:r>
-              <a:rPr lang="en-US" sz="1600" dirty="0">
+              <a:rPr lang="en-US" sz="1400" dirty="0">
                 <a:latin typeface="Open Sans" panose="020B0606030504020204" pitchFamily="34" charset="0"/>
                 <a:ea typeface="Open Sans" panose="020B0606030504020204" pitchFamily="34" charset="0"/>
                 <a:cs typeface="Open Sans" panose="020B0606030504020204" pitchFamily="34" charset="0"/>
               </a:rPr>
-              <a:t>The </a:t>
-            </a:r>
-            <a:r>
-              <a:rPr lang="en-US" sz="1600" dirty="0">
+              <a:t>Outside of looking at age, income, and spending score, I could analyze other factors which influence customer spending in shopping malls. According to </a:t>
+            </a:r>
+            <a:r>
+              <a:rPr lang="en-US" sz="1400" dirty="0">
                 <a:latin typeface="Open Sans" panose="020B0606030504020204" pitchFamily="34" charset="0"/>
                 <a:ea typeface="Open Sans" panose="020B0606030504020204" pitchFamily="34" charset="0"/>
                 <a:cs typeface="Open Sans" panose="020B0606030504020204" pitchFamily="34" charset="0"/>
-                <a:hlinkClick r:id="rId3"/>
-              </a:rPr>
-              <a:t>same notebook</a:t>
-            </a:r>
-            <a:r>
-              <a:rPr lang="en-US" sz="1600" dirty="0">
+                <a:hlinkClick r:id="rId2"/>
+              </a:rPr>
+              <a:t>this study</a:t>
+            </a:r>
+            <a:r>
+              <a:rPr lang="en-US" sz="1400" dirty="0">
                 <a:latin typeface="Open Sans" panose="020B0606030504020204" pitchFamily="34" charset="0"/>
                 <a:ea typeface="Open Sans" panose="020B0606030504020204" pitchFamily="34" charset="0"/>
                 <a:cs typeface="Open Sans" panose="020B0606030504020204" pitchFamily="34" charset="0"/>
               </a:rPr>
-              <a:t> is also on Kaggle. </a:t>
+              <a:t>, mall architecture, security, music, and available parking all have significant impact on consumers. </a:t>
             </a:r>
           </a:p>
           <a:p>
@@ -10170,6 +9632,31 @@
               <a:buFont typeface="Open Sans"/>
               <a:buChar char="●"/>
             </a:pPr>
+            <a:r>
+              <a:rPr lang="en-US" sz="1400" dirty="0">
+                <a:latin typeface="Open Sans" panose="020B0606030504020204" pitchFamily="34" charset="0"/>
+                <a:ea typeface="Open Sans" panose="020B0606030504020204" pitchFamily="34" charset="0"/>
+                <a:cs typeface="Open Sans" panose="020B0606030504020204" pitchFamily="34" charset="0"/>
+              </a:rPr>
+              <a:t>I could also segment customers based on their activities in the mall. According to </a:t>
+            </a:r>
+            <a:r>
+              <a:rPr lang="en-US" sz="1400" dirty="0">
+                <a:latin typeface="Open Sans" panose="020B0606030504020204" pitchFamily="34" charset="0"/>
+                <a:ea typeface="Open Sans" panose="020B0606030504020204" pitchFamily="34" charset="0"/>
+                <a:cs typeface="Open Sans" panose="020B0606030504020204" pitchFamily="34" charset="0"/>
+                <a:hlinkClick r:id="rId3"/>
+              </a:rPr>
+              <a:t>this study</a:t>
+            </a:r>
+            <a:r>
+              <a:rPr lang="en-US" sz="1400" dirty="0">
+                <a:latin typeface="Open Sans" panose="020B0606030504020204" pitchFamily="34" charset="0"/>
+                <a:ea typeface="Open Sans" panose="020B0606030504020204" pitchFamily="34" charset="0"/>
+                <a:cs typeface="Open Sans" panose="020B0606030504020204" pitchFamily="34" charset="0"/>
+              </a:rPr>
+              <a:t>, mall atmosphere (odors, music and decorations), density (number of shoppers), and store preferences also have a large impact on consumer spending.</a:t>
+            </a:r>
             <a:endParaRPr lang="en-US" sz="1400" b="0" dirty="0">
               <a:solidFill>
                 <a:schemeClr val="dk1"/>
@@ -10205,37 +9692,12 @@
               <a:sym typeface="Open Sans"/>
             </a:endParaRPr>
           </a:p>
-          <a:p>
-            <a:pPr marL="457200" lvl="0" indent="-342900" algn="l" rtl="0">
-              <a:spcBef>
-                <a:spcPts val="0"/>
-              </a:spcBef>
-              <a:spcAft>
-                <a:spcPts val="0"/>
-              </a:spcAft>
-              <a:buClr>
-                <a:schemeClr val="dk1"/>
-              </a:buClr>
-              <a:buSzPts val="1800"/>
-              <a:buFont typeface="Open Sans"/>
-              <a:buChar char="●"/>
-            </a:pPr>
-            <a:endParaRPr lang="en-US" sz="1400" b="0" dirty="0">
-              <a:solidFill>
-                <a:schemeClr val="dk1"/>
-              </a:solidFill>
-              <a:latin typeface="Open Sans"/>
-              <a:ea typeface="Open Sans"/>
-              <a:cs typeface="Open Sans"/>
-              <a:sym typeface="Open Sans"/>
-            </a:endParaRPr>
-          </a:p>
         </p:txBody>
       </p:sp>
     </p:spTree>
     <p:extLst>
       <p:ext uri="{BB962C8B-B14F-4D97-AF65-F5344CB8AC3E}">
-        <p14:creationId xmlns:p14="http://schemas.microsoft.com/office/powerpoint/2010/main" val="2588408881"/>
+        <p14:creationId xmlns:p14="http://schemas.microsoft.com/office/powerpoint/2010/main" val="1666120286"/>
       </p:ext>
     </p:extLst>
   </p:cSld>
@@ -10297,7 +9759,7 @@
             </a:pPr>
             <a:r>
               <a:rPr lang="en-US" sz="2800" dirty="0"/>
-              <a:t>Machine Learning Competitions</a:t>
+              <a:t>Notebook Locations</a:t>
             </a:r>
             <a:endParaRPr sz="2800" spc="110" dirty="0"/>
           </a:p>
@@ -10429,7 +9891,7 @@
         <p:spPr>
           <a:xfrm>
             <a:off x="1066800" y="1885950"/>
-            <a:ext cx="6549390" cy="2875146"/>
+            <a:ext cx="6549390" cy="689932"/>
           </a:xfrm>
           <a:prstGeom prst="rect">
             <a:avLst/>
@@ -10461,7 +9923,23 @@
                 <a:ea typeface="Open Sans" panose="020B0606030504020204" pitchFamily="34" charset="0"/>
                 <a:cs typeface="Open Sans" panose="020B0606030504020204" pitchFamily="34" charset="0"/>
               </a:rPr>
-              <a:t>Kaggle hosts a variety of machine learning competitions including </a:t>
+              <a:t>A </a:t>
+            </a:r>
+            <a:r>
+              <a:rPr lang="en-US" sz="1600" dirty="0" err="1">
+                <a:latin typeface="Open Sans" panose="020B0606030504020204" pitchFamily="34" charset="0"/>
+                <a:ea typeface="Open Sans" panose="020B0606030504020204" pitchFamily="34" charset="0"/>
+                <a:cs typeface="Open Sans" panose="020B0606030504020204" pitchFamily="34" charset="0"/>
+              </a:rPr>
+              <a:t>Jupyter</a:t>
+            </a:r>
+            <a:r>
+              <a:rPr lang="en-US" sz="1600" dirty="0">
+                <a:latin typeface="Open Sans" panose="020B0606030504020204" pitchFamily="34" charset="0"/>
+                <a:ea typeface="Open Sans" panose="020B0606030504020204" pitchFamily="34" charset="0"/>
+                <a:cs typeface="Open Sans" panose="020B0606030504020204" pitchFamily="34" charset="0"/>
+              </a:rPr>
+              <a:t> notebook of my work can be found </a:t>
             </a:r>
             <a:r>
               <a:rPr lang="en-US" sz="1600" dirty="0">
@@ -10470,7 +9948,7 @@
                 <a:cs typeface="Open Sans" panose="020B0606030504020204" pitchFamily="34" charset="0"/>
                 <a:hlinkClick r:id="rId2"/>
               </a:rPr>
-              <a:t>predicting sales of house prices</a:t>
+              <a:t>here</a:t>
             </a:r>
             <a:r>
               <a:rPr lang="en-US" sz="1600" dirty="0">
@@ -10478,106 +9956,8 @@
                 <a:ea typeface="Open Sans" panose="020B0606030504020204" pitchFamily="34" charset="0"/>
                 <a:cs typeface="Open Sans" panose="020B0606030504020204" pitchFamily="34" charset="0"/>
               </a:rPr>
-              <a:t>, </a:t>
-            </a:r>
-            <a:r>
-              <a:rPr lang="en-US" sz="1600" dirty="0">
-                <a:latin typeface="Open Sans" panose="020B0606030504020204" pitchFamily="34" charset="0"/>
-                <a:ea typeface="Open Sans" panose="020B0606030504020204" pitchFamily="34" charset="0"/>
-                <a:cs typeface="Open Sans" panose="020B0606030504020204" pitchFamily="34" charset="0"/>
-                <a:hlinkClick r:id="rId3"/>
-              </a:rPr>
-              <a:t>natural language processing for disaster tweets</a:t>
-            </a:r>
-            <a:r>
-              <a:rPr lang="en-US" sz="1600" dirty="0">
-                <a:latin typeface="Open Sans" panose="020B0606030504020204" pitchFamily="34" charset="0"/>
-                <a:ea typeface="Open Sans" panose="020B0606030504020204" pitchFamily="34" charset="0"/>
-                <a:cs typeface="Open Sans" panose="020B0606030504020204" pitchFamily="34" charset="0"/>
-              </a:rPr>
-              <a:t>, and </a:t>
-            </a:r>
-            <a:r>
-              <a:rPr lang="en-US" sz="1600" dirty="0">
-                <a:latin typeface="Open Sans" panose="020B0606030504020204" pitchFamily="34" charset="0"/>
-                <a:ea typeface="Open Sans" panose="020B0606030504020204" pitchFamily="34" charset="0"/>
-                <a:cs typeface="Open Sans" panose="020B0606030504020204" pitchFamily="34" charset="0"/>
-                <a:hlinkClick r:id="rId4"/>
-              </a:rPr>
-              <a:t>classifying Arabic letters through images</a:t>
-            </a:r>
-            <a:r>
-              <a:rPr lang="en-US" sz="1600" dirty="0">
-                <a:latin typeface="Open Sans" panose="020B0606030504020204" pitchFamily="34" charset="0"/>
-                <a:ea typeface="Open Sans" panose="020B0606030504020204" pitchFamily="34" charset="0"/>
-                <a:cs typeface="Open Sans" panose="020B0606030504020204" pitchFamily="34" charset="0"/>
-              </a:rPr>
               <a:t>.</a:t>
             </a:r>
-          </a:p>
-          <a:p>
-            <a:pPr marL="457200" lvl="0" indent="-342900" algn="l" rtl="0">
-              <a:spcBef>
-                <a:spcPts val="0"/>
-              </a:spcBef>
-              <a:spcAft>
-                <a:spcPts val="0"/>
-              </a:spcAft>
-              <a:buClr>
-                <a:schemeClr val="dk1"/>
-              </a:buClr>
-              <a:buSzPts val="1800"/>
-              <a:buFont typeface="Open Sans"/>
-              <a:buChar char="●"/>
-            </a:pPr>
-            <a:r>
-              <a:rPr lang="en-US" sz="1600" dirty="0">
-                <a:latin typeface="Open Sans" panose="020B0606030504020204" pitchFamily="34" charset="0"/>
-                <a:ea typeface="Open Sans" panose="020B0606030504020204" pitchFamily="34" charset="0"/>
-                <a:cs typeface="Open Sans" panose="020B0606030504020204" pitchFamily="34" charset="0"/>
-              </a:rPr>
-              <a:t>I would like to get more involved with the community and participate in competitions.</a:t>
-            </a:r>
-          </a:p>
-          <a:p>
-            <a:pPr marL="457200" lvl="0" indent="-342900" algn="l" rtl="0">
-              <a:spcBef>
-                <a:spcPts val="0"/>
-              </a:spcBef>
-              <a:spcAft>
-                <a:spcPts val="0"/>
-              </a:spcAft>
-              <a:buClr>
-                <a:schemeClr val="dk1"/>
-              </a:buClr>
-              <a:buSzPts val="1800"/>
-              <a:buFont typeface="Open Sans"/>
-              <a:buChar char="●"/>
-            </a:pPr>
-            <a:r>
-              <a:rPr lang="en-US" sz="1600" dirty="0">
-                <a:latin typeface="Open Sans" panose="020B0606030504020204" pitchFamily="34" charset="0"/>
-                <a:ea typeface="Open Sans" panose="020B0606030504020204" pitchFamily="34" charset="0"/>
-                <a:cs typeface="Open Sans" panose="020B0606030504020204" pitchFamily="34" charset="0"/>
-              </a:rPr>
-              <a:t>I am active in two ML Meetup groups and would like to become more active with the machine learning community in Ann Arbor (and elsewhere).</a:t>
-            </a:r>
-          </a:p>
-          <a:p>
-            <a:pPr marL="457200" lvl="0" indent="-342900" algn="l" rtl="0">
-              <a:spcBef>
-                <a:spcPts val="0"/>
-              </a:spcBef>
-              <a:spcAft>
-                <a:spcPts val="0"/>
-              </a:spcAft>
-              <a:buClr>
-                <a:schemeClr val="dk1"/>
-              </a:buClr>
-              <a:buSzPts val="1800"/>
-              <a:buFont typeface="Open Sans"/>
-              <a:buChar char="●"/>
-            </a:pPr>
             <a:endParaRPr lang="en-US" sz="1400" b="0" dirty="0">
               <a:solidFill>
                 <a:schemeClr val="dk1"/>
@@ -10643,7 +10023,7 @@
     </p:spTree>
     <p:extLst>
       <p:ext uri="{BB962C8B-B14F-4D97-AF65-F5344CB8AC3E}">
-        <p14:creationId xmlns:p14="http://schemas.microsoft.com/office/powerpoint/2010/main" val="2053165355"/>
+        <p14:creationId xmlns:p14="http://schemas.microsoft.com/office/powerpoint/2010/main" val="2588408881"/>
       </p:ext>
     </p:extLst>
   </p:cSld>
@@ -11169,7 +10549,7 @@
                 <a:cs typeface="Open Sans"/>
                 <a:sym typeface="Open Sans"/>
               </a:rPr>
-              <a:t>Spending score is a number from 0-100 which predicts spending potential. Higher score translates to high spending potential.</a:t>
+              <a:t>Spending score is a number from 0-100 which predicts spending potential. Higher spending score translates to high spending potential.</a:t>
             </a:r>
           </a:p>
           <a:p>
@@ -12962,18 +12342,18 @@
 </file>
 
 <file path=customXml/item1.xml><?xml version="1.0" encoding="utf-8"?>
-<p:properties xmlns:p="http://schemas.microsoft.com/office/2006/metadata/properties" xmlns:xsi="http://www.w3.org/2001/XMLSchema-instance" xmlns:pc="http://schemas.microsoft.com/office/infopath/2007/PartnerControls">
-  <documentManagement/>
-</p:properties>
-</file>
-
-<file path=customXml/item2.xml><?xml version="1.0" encoding="utf-8"?>
 <?mso-contentType ?>
 <FormTemplates xmlns="http://schemas.microsoft.com/sharepoint/v3/contenttype/forms">
   <Display>DocumentLibraryForm</Display>
   <Edit>DocumentLibraryForm</Edit>
   <New>DocumentLibraryForm</New>
 </FormTemplates>
+</file>
+
+<file path=customXml/item2.xml><?xml version="1.0" encoding="utf-8"?>
+<p:properties xmlns:p="http://schemas.microsoft.com/office/2006/metadata/properties" xmlns:xsi="http://www.w3.org/2001/XMLSchema-instance" xmlns:pc="http://schemas.microsoft.com/office/infopath/2007/PartnerControls">
+  <documentManagement/>
+</p:properties>
 </file>
 
 <file path=customXml/item3.xml><?xml version="1.0" encoding="utf-8"?>
@@ -13115,6 +12495,14 @@
 </file>
 
 <file path=customXml/itemProps1.xml><?xml version="1.0" encoding="utf-8"?>
+<ds:datastoreItem xmlns:ds="http://schemas.openxmlformats.org/officeDocument/2006/customXml" ds:itemID="{0999F663-0E37-44AA-84EA-92ADA0BC51CA}">
+  <ds:schemaRefs>
+    <ds:schemaRef ds:uri="http://schemas.microsoft.com/sharepoint/v3/contenttype/forms"/>
+  </ds:schemaRefs>
+</ds:datastoreItem>
+</file>
+
+<file path=customXml/itemProps2.xml><?xml version="1.0" encoding="utf-8"?>
 <ds:datastoreItem xmlns:ds="http://schemas.openxmlformats.org/officeDocument/2006/customXml" ds:itemID="{B1EEBF50-D743-4E1A-BCFF-3B923D42AE13}">
   <ds:schemaRefs>
     <ds:schemaRef ds:uri="http://schemas.openxmlformats.org/package/2006/metadata/core-properties"/>
@@ -13126,14 +12514,6 @@
     <ds:schemaRef ds:uri="http://purl.org/dc/terms/"/>
     <ds:schemaRef ds:uri="http://schemas.microsoft.com/office/2006/documentManagement/types"/>
     <ds:schemaRef ds:uri="http://schemas.microsoft.com/office/infopath/2007/PartnerControls"/>
-  </ds:schemaRefs>
-</ds:datastoreItem>
-</file>
-
-<file path=customXml/itemProps2.xml><?xml version="1.0" encoding="utf-8"?>
-<ds:datastoreItem xmlns:ds="http://schemas.openxmlformats.org/officeDocument/2006/customXml" ds:itemID="{0999F663-0E37-44AA-84EA-92ADA0BC51CA}">
-  <ds:schemaRefs>
-    <ds:schemaRef ds:uri="http://schemas.microsoft.com/sharepoint/v3/contenttype/forms"/>
   </ds:schemaRefs>
 </ds:datastoreItem>
 </file>

</xml_diff>